<commit_message>
added links to agile article
</commit_message>
<xml_diff>
--- a/docs/images/Pictures for blog.pptx
+++ b/docs/images/Pictures for blog.pptx
@@ -6,8 +6,10 @@
   </p:sldMasterIdLst>
   <p:sldIdLst>
     <p:sldId id="257" r:id="rId2"/>
-    <p:sldId id="258" r:id="rId3"/>
-    <p:sldId id="256" r:id="rId4"/>
+    <p:sldId id="260" r:id="rId3"/>
+    <p:sldId id="259" r:id="rId4"/>
+    <p:sldId id="258" r:id="rId5"/>
+    <p:sldId id="256" r:id="rId6"/>
   </p:sldIdLst>
   <p:sldSz cx="12192000" cy="6858000"/>
   <p:notesSz cx="6858000" cy="9144000"/>
@@ -265,7 +267,7 @@
           <a:p>
             <a:fld id="{A42A12F9-EA54-49E1-A3FD-186D9B25B348}" type="datetimeFigureOut">
               <a:rPr lang="pl-PL" smtClean="0"/>
-              <a:t>29.06.2019</a:t>
+              <a:t>08.07.2019</a:t>
             </a:fld>
             <a:endParaRPr lang="pl-PL"/>
           </a:p>
@@ -463,7 +465,7 @@
           <a:p>
             <a:fld id="{A42A12F9-EA54-49E1-A3FD-186D9B25B348}" type="datetimeFigureOut">
               <a:rPr lang="pl-PL" smtClean="0"/>
-              <a:t>29.06.2019</a:t>
+              <a:t>08.07.2019</a:t>
             </a:fld>
             <a:endParaRPr lang="pl-PL"/>
           </a:p>
@@ -671,7 +673,7 @@
           <a:p>
             <a:fld id="{A42A12F9-EA54-49E1-A3FD-186D9B25B348}" type="datetimeFigureOut">
               <a:rPr lang="pl-PL" smtClean="0"/>
-              <a:t>29.06.2019</a:t>
+              <a:t>08.07.2019</a:t>
             </a:fld>
             <a:endParaRPr lang="pl-PL"/>
           </a:p>
@@ -869,7 +871,7 @@
           <a:p>
             <a:fld id="{A42A12F9-EA54-49E1-A3FD-186D9B25B348}" type="datetimeFigureOut">
               <a:rPr lang="pl-PL" smtClean="0"/>
-              <a:t>29.06.2019</a:t>
+              <a:t>08.07.2019</a:t>
             </a:fld>
             <a:endParaRPr lang="pl-PL"/>
           </a:p>
@@ -1144,7 +1146,7 @@
           <a:p>
             <a:fld id="{A42A12F9-EA54-49E1-A3FD-186D9B25B348}" type="datetimeFigureOut">
               <a:rPr lang="pl-PL" smtClean="0"/>
-              <a:t>29.06.2019</a:t>
+              <a:t>08.07.2019</a:t>
             </a:fld>
             <a:endParaRPr lang="pl-PL"/>
           </a:p>
@@ -1409,7 +1411,7 @@
           <a:p>
             <a:fld id="{A42A12F9-EA54-49E1-A3FD-186D9B25B348}" type="datetimeFigureOut">
               <a:rPr lang="pl-PL" smtClean="0"/>
-              <a:t>29.06.2019</a:t>
+              <a:t>08.07.2019</a:t>
             </a:fld>
             <a:endParaRPr lang="pl-PL"/>
           </a:p>
@@ -1821,7 +1823,7 @@
           <a:p>
             <a:fld id="{A42A12F9-EA54-49E1-A3FD-186D9B25B348}" type="datetimeFigureOut">
               <a:rPr lang="pl-PL" smtClean="0"/>
-              <a:t>29.06.2019</a:t>
+              <a:t>08.07.2019</a:t>
             </a:fld>
             <a:endParaRPr lang="pl-PL"/>
           </a:p>
@@ -1962,7 +1964,7 @@
           <a:p>
             <a:fld id="{A42A12F9-EA54-49E1-A3FD-186D9B25B348}" type="datetimeFigureOut">
               <a:rPr lang="pl-PL" smtClean="0"/>
-              <a:t>29.06.2019</a:t>
+              <a:t>08.07.2019</a:t>
             </a:fld>
             <a:endParaRPr lang="pl-PL"/>
           </a:p>
@@ -2075,7 +2077,7 @@
           <a:p>
             <a:fld id="{A42A12F9-EA54-49E1-A3FD-186D9B25B348}" type="datetimeFigureOut">
               <a:rPr lang="pl-PL" smtClean="0"/>
-              <a:t>29.06.2019</a:t>
+              <a:t>08.07.2019</a:t>
             </a:fld>
             <a:endParaRPr lang="pl-PL"/>
           </a:p>
@@ -2386,7 +2388,7 @@
           <a:p>
             <a:fld id="{A42A12F9-EA54-49E1-A3FD-186D9B25B348}" type="datetimeFigureOut">
               <a:rPr lang="pl-PL" smtClean="0"/>
-              <a:t>29.06.2019</a:t>
+              <a:t>08.07.2019</a:t>
             </a:fld>
             <a:endParaRPr lang="pl-PL"/>
           </a:p>
@@ -2674,7 +2676,7 @@
           <a:p>
             <a:fld id="{A42A12F9-EA54-49E1-A3FD-186D9B25B348}" type="datetimeFigureOut">
               <a:rPr lang="pl-PL" smtClean="0"/>
-              <a:t>29.06.2019</a:t>
+              <a:t>08.07.2019</a:t>
             </a:fld>
             <a:endParaRPr lang="pl-PL"/>
           </a:p>
@@ -2915,7 +2917,7 @@
           <a:p>
             <a:fld id="{A42A12F9-EA54-49E1-A3FD-186D9B25B348}" type="datetimeFigureOut">
               <a:rPr lang="pl-PL" smtClean="0"/>
-              <a:t>29.06.2019</a:t>
+              <a:t>08.07.2019</a:t>
             </a:fld>
             <a:endParaRPr lang="pl-PL"/>
           </a:p>
@@ -3466,6 +3468,2728 @@
           </a:prstGeom>
         </p:spPr>
       </p:pic>
+      <p:grpSp>
+        <p:nvGrpSpPr>
+          <p:cNvPr id="25" name="Grupa 24">
+            <a:extLst>
+              <a:ext uri="{FF2B5EF4-FFF2-40B4-BE49-F238E27FC236}">
+                <a16:creationId xmlns:a16="http://schemas.microsoft.com/office/drawing/2014/main" id="{C771E598-2B42-4372-A6E4-D00DD79C1204}"/>
+              </a:ext>
+            </a:extLst>
+          </p:cNvPr>
+          <p:cNvGrpSpPr/>
+          <p:nvPr/>
+        </p:nvGrpSpPr>
+        <p:grpSpPr>
+          <a:xfrm>
+            <a:off x="1389675" y="1061746"/>
+            <a:ext cx="8006609" cy="4548405"/>
+            <a:chOff x="819338" y="734449"/>
+            <a:chExt cx="8880091" cy="5261327"/>
+          </a:xfrm>
+        </p:grpSpPr>
+        <p:grpSp>
+          <p:nvGrpSpPr>
+            <p:cNvPr id="16" name="Grupa 15">
+              <a:extLst>
+                <a:ext uri="{FF2B5EF4-FFF2-40B4-BE49-F238E27FC236}">
+                  <a16:creationId xmlns:a16="http://schemas.microsoft.com/office/drawing/2014/main" id="{63276588-39AF-441C-B9F1-57909137CB0D}"/>
+                </a:ext>
+              </a:extLst>
+            </p:cNvPr>
+            <p:cNvGrpSpPr/>
+            <p:nvPr/>
+          </p:nvGrpSpPr>
+          <p:grpSpPr>
+            <a:xfrm>
+              <a:off x="1000359" y="852407"/>
+              <a:ext cx="8699070" cy="5143369"/>
+              <a:chOff x="881090" y="937755"/>
+              <a:chExt cx="8699070" cy="5143369"/>
+            </a:xfrm>
+            <a:solidFill>
+              <a:schemeClr val="tx1"/>
+            </a:solidFill>
+          </p:grpSpPr>
+          <p:sp>
+            <p:nvSpPr>
+              <p:cNvPr id="11" name="Strzałka: kolista 10">
+                <a:extLst>
+                  <a:ext uri="{FF2B5EF4-FFF2-40B4-BE49-F238E27FC236}">
+                    <a16:creationId xmlns:a16="http://schemas.microsoft.com/office/drawing/2014/main" id="{E7EF9396-B6F4-4E7F-A88D-ECFFBF6A6D9E}"/>
+                  </a:ext>
+                </a:extLst>
+              </p:cNvPr>
+              <p:cNvSpPr/>
+              <p:nvPr/>
+            </p:nvSpPr>
+            <p:spPr>
+              <a:xfrm rot="4232097">
+                <a:off x="4720754" y="1774172"/>
+                <a:ext cx="3989259" cy="3506544"/>
+              </a:xfrm>
+              <a:prstGeom prst="circularArrow">
+                <a:avLst>
+                  <a:gd name="adj1" fmla="val 17285"/>
+                  <a:gd name="adj2" fmla="val 817767"/>
+                  <a:gd name="adj3" fmla="val 20220068"/>
+                  <a:gd name="adj4" fmla="val 13674065"/>
+                  <a:gd name="adj5" fmla="val 13816"/>
+                </a:avLst>
+              </a:prstGeom>
+              <a:grpFill/>
+              <a:ln>
+                <a:noFill/>
+              </a:ln>
+            </p:spPr>
+            <p:style>
+              <a:lnRef idx="2">
+                <a:schemeClr val="accent6"/>
+              </a:lnRef>
+              <a:fillRef idx="1">
+                <a:schemeClr val="lt1"/>
+              </a:fillRef>
+              <a:effectRef idx="0">
+                <a:schemeClr val="accent6"/>
+              </a:effectRef>
+              <a:fontRef idx="minor">
+                <a:schemeClr val="dk1"/>
+              </a:fontRef>
+            </p:style>
+            <p:txBody>
+              <a:bodyPr rtlCol="0" anchor="ctr"/>
+              <a:lstStyle/>
+              <a:p>
+                <a:pPr algn="ctr"/>
+                <a:endParaRPr lang="pl-PL" dirty="0">
+                  <a:solidFill>
+                    <a:schemeClr val="tx1"/>
+                  </a:solidFill>
+                </a:endParaRPr>
+              </a:p>
+            </p:txBody>
+          </p:sp>
+          <p:sp>
+            <p:nvSpPr>
+              <p:cNvPr id="12" name="Strzałka: kolista 11">
+                <a:extLst>
+                  <a:ext uri="{FF2B5EF4-FFF2-40B4-BE49-F238E27FC236}">
+                    <a16:creationId xmlns:a16="http://schemas.microsoft.com/office/drawing/2014/main" id="{E63943B3-62F3-4E65-8BC8-121E621AA861}"/>
+                  </a:ext>
+                </a:extLst>
+              </p:cNvPr>
+              <p:cNvSpPr/>
+              <p:nvPr/>
+            </p:nvSpPr>
+            <p:spPr>
+              <a:xfrm rot="17588791">
+                <a:off x="4634487" y="2601821"/>
+                <a:ext cx="3356567" cy="3602040"/>
+              </a:xfrm>
+              <a:prstGeom prst="circularArrow">
+                <a:avLst>
+                  <a:gd name="adj1" fmla="val 17285"/>
+                  <a:gd name="adj2" fmla="val 817767"/>
+                  <a:gd name="adj3" fmla="val 20220068"/>
+                  <a:gd name="adj4" fmla="val 14902528"/>
+                  <a:gd name="adj5" fmla="val 13816"/>
+                </a:avLst>
+              </a:prstGeom>
+              <a:grpFill/>
+              <a:ln>
+                <a:noFill/>
+              </a:ln>
+            </p:spPr>
+            <p:style>
+              <a:lnRef idx="2">
+                <a:schemeClr val="accent6"/>
+              </a:lnRef>
+              <a:fillRef idx="1">
+                <a:schemeClr val="lt1"/>
+              </a:fillRef>
+              <a:effectRef idx="0">
+                <a:schemeClr val="accent6"/>
+              </a:effectRef>
+              <a:fontRef idx="minor">
+                <a:schemeClr val="dk1"/>
+              </a:fontRef>
+            </p:style>
+            <p:txBody>
+              <a:bodyPr rtlCol="0" anchor="ctr"/>
+              <a:lstStyle/>
+              <a:p>
+                <a:pPr algn="ctr"/>
+                <a:endParaRPr lang="pl-PL" dirty="0">
+                  <a:solidFill>
+                    <a:schemeClr val="tx1"/>
+                  </a:solidFill>
+                </a:endParaRPr>
+              </a:p>
+            </p:txBody>
+          </p:sp>
+          <p:grpSp>
+            <p:nvGrpSpPr>
+              <p:cNvPr id="15" name="Grupa 14">
+                <a:extLst>
+                  <a:ext uri="{FF2B5EF4-FFF2-40B4-BE49-F238E27FC236}">
+                    <a16:creationId xmlns:a16="http://schemas.microsoft.com/office/drawing/2014/main" id="{10E89492-F0E1-4D71-810E-2D7089DE2B39}"/>
+                  </a:ext>
+                </a:extLst>
+              </p:cNvPr>
+              <p:cNvGrpSpPr/>
+              <p:nvPr/>
+            </p:nvGrpSpPr>
+            <p:grpSpPr>
+              <a:xfrm>
+                <a:off x="881090" y="937755"/>
+                <a:ext cx="8699070" cy="4841814"/>
+                <a:chOff x="73325" y="1052234"/>
+                <a:chExt cx="8699070" cy="4841814"/>
+              </a:xfrm>
+              <a:grpFill/>
+            </p:grpSpPr>
+            <p:sp>
+              <p:nvSpPr>
+                <p:cNvPr id="4" name="Strzałka: kolista 3">
+                  <a:extLst>
+                    <a:ext uri="{FF2B5EF4-FFF2-40B4-BE49-F238E27FC236}">
+                      <a16:creationId xmlns:a16="http://schemas.microsoft.com/office/drawing/2014/main" id="{870A6785-E29A-4081-909E-EAFF0039874B}"/>
+                    </a:ext>
+                  </a:extLst>
+                </p:cNvPr>
+                <p:cNvSpPr/>
+                <p:nvPr/>
+              </p:nvSpPr>
+              <p:spPr>
+                <a:xfrm rot="19837530">
+                  <a:off x="3219102" y="1605390"/>
+                  <a:ext cx="3989259" cy="3506544"/>
+                </a:xfrm>
+                <a:prstGeom prst="circularArrow">
+                  <a:avLst>
+                    <a:gd name="adj1" fmla="val 17285"/>
+                    <a:gd name="adj2" fmla="val 817767"/>
+                    <a:gd name="adj3" fmla="val 20220068"/>
+                    <a:gd name="adj4" fmla="val 13674065"/>
+                    <a:gd name="adj5" fmla="val 13816"/>
+                  </a:avLst>
+                </a:prstGeom>
+                <a:grpFill/>
+                <a:ln>
+                  <a:noFill/>
+                </a:ln>
+              </p:spPr>
+              <p:style>
+                <a:lnRef idx="2">
+                  <a:schemeClr val="accent6"/>
+                </a:lnRef>
+                <a:fillRef idx="1">
+                  <a:schemeClr val="lt1"/>
+                </a:fillRef>
+                <a:effectRef idx="0">
+                  <a:schemeClr val="accent6"/>
+                </a:effectRef>
+                <a:fontRef idx="minor">
+                  <a:schemeClr val="dk1"/>
+                </a:fontRef>
+              </p:style>
+              <p:txBody>
+                <a:bodyPr rtlCol="0" anchor="ctr"/>
+                <a:lstStyle/>
+                <a:p>
+                  <a:pPr algn="ctr"/>
+                  <a:endParaRPr lang="pl-PL" dirty="0">
+                    <a:solidFill>
+                      <a:schemeClr val="tx1"/>
+                    </a:solidFill>
+                  </a:endParaRPr>
+                </a:p>
+              </p:txBody>
+            </p:sp>
+            <p:sp>
+              <p:nvSpPr>
+                <p:cNvPr id="10" name="Strzałka: kolista 9">
+                  <a:extLst>
+                    <a:ext uri="{FF2B5EF4-FFF2-40B4-BE49-F238E27FC236}">
+                      <a16:creationId xmlns:a16="http://schemas.microsoft.com/office/drawing/2014/main" id="{9DE398AA-FD57-4685-8064-54DC1C1E3611}"/>
+                    </a:ext>
+                  </a:extLst>
+                </p:cNvPr>
+                <p:cNvSpPr/>
+                <p:nvPr/>
+              </p:nvSpPr>
+              <p:spPr>
+                <a:xfrm rot="10036440">
+                  <a:off x="3727731" y="2387504"/>
+                  <a:ext cx="3989259" cy="3506544"/>
+                </a:xfrm>
+                <a:prstGeom prst="circularArrow">
+                  <a:avLst>
+                    <a:gd name="adj1" fmla="val 17285"/>
+                    <a:gd name="adj2" fmla="val 817767"/>
+                    <a:gd name="adj3" fmla="val 20220068"/>
+                    <a:gd name="adj4" fmla="val 14902528"/>
+                    <a:gd name="adj5" fmla="val 13816"/>
+                  </a:avLst>
+                </a:prstGeom>
+                <a:grpFill/>
+                <a:ln>
+                  <a:noFill/>
+                </a:ln>
+              </p:spPr>
+              <p:style>
+                <a:lnRef idx="2">
+                  <a:schemeClr val="accent6"/>
+                </a:lnRef>
+                <a:fillRef idx="1">
+                  <a:schemeClr val="lt1"/>
+                </a:fillRef>
+                <a:effectRef idx="0">
+                  <a:schemeClr val="accent6"/>
+                </a:effectRef>
+                <a:fontRef idx="minor">
+                  <a:schemeClr val="dk1"/>
+                </a:fontRef>
+              </p:style>
+              <p:txBody>
+                <a:bodyPr rtlCol="0" anchor="ctr"/>
+                <a:lstStyle/>
+                <a:p>
+                  <a:pPr algn="ctr"/>
+                  <a:endParaRPr lang="pl-PL" dirty="0">
+                    <a:solidFill>
+                      <a:schemeClr val="tx1"/>
+                    </a:solidFill>
+                  </a:endParaRPr>
+                </a:p>
+              </p:txBody>
+            </p:sp>
+            <p:sp>
+              <p:nvSpPr>
+                <p:cNvPr id="13" name="Strzałka: kolista 12">
+                  <a:extLst>
+                    <a:ext uri="{FF2B5EF4-FFF2-40B4-BE49-F238E27FC236}">
+                      <a16:creationId xmlns:a16="http://schemas.microsoft.com/office/drawing/2014/main" id="{42B8EAF6-93F2-4B84-8729-C94AE784048B}"/>
+                    </a:ext>
+                  </a:extLst>
+                </p:cNvPr>
+                <p:cNvSpPr/>
+                <p:nvPr/>
+              </p:nvSpPr>
+              <p:spPr>
+                <a:xfrm rot="381463" flipV="1">
+                  <a:off x="73325" y="1052234"/>
+                  <a:ext cx="4285302" cy="3507415"/>
+                </a:xfrm>
+                <a:prstGeom prst="circularArrow">
+                  <a:avLst>
+                    <a:gd name="adj1" fmla="val 17285"/>
+                    <a:gd name="adj2" fmla="val 817767"/>
+                    <a:gd name="adj3" fmla="val 20220068"/>
+                    <a:gd name="adj4" fmla="val 15375350"/>
+                    <a:gd name="adj5" fmla="val 13816"/>
+                  </a:avLst>
+                </a:prstGeom>
+                <a:grpFill/>
+                <a:ln>
+                  <a:noFill/>
+                </a:ln>
+              </p:spPr>
+              <p:style>
+                <a:lnRef idx="2">
+                  <a:schemeClr val="accent6"/>
+                </a:lnRef>
+                <a:fillRef idx="1">
+                  <a:schemeClr val="lt1"/>
+                </a:fillRef>
+                <a:effectRef idx="0">
+                  <a:schemeClr val="accent6"/>
+                </a:effectRef>
+                <a:fontRef idx="minor">
+                  <a:schemeClr val="dk1"/>
+                </a:fontRef>
+              </p:style>
+              <p:txBody>
+                <a:bodyPr rtlCol="0" anchor="ctr"/>
+                <a:lstStyle/>
+                <a:p>
+                  <a:pPr algn="ctr"/>
+                  <a:endParaRPr lang="pl-PL" dirty="0">
+                    <a:solidFill>
+                      <a:schemeClr val="tx1"/>
+                    </a:solidFill>
+                  </a:endParaRPr>
+                </a:p>
+              </p:txBody>
+            </p:sp>
+            <p:pic>
+              <p:nvPicPr>
+                <p:cNvPr id="3" name="Grafika 2" descr="Strzałka: lekko zakrzywiona">
+                  <a:extLst>
+                    <a:ext uri="{FF2B5EF4-FFF2-40B4-BE49-F238E27FC236}">
+                      <a16:creationId xmlns:a16="http://schemas.microsoft.com/office/drawing/2014/main" id="{3803A2AA-B9A4-4545-B40C-CF67E6456884}"/>
+                    </a:ext>
+                  </a:extLst>
+                </p:cNvPr>
+                <p:cNvPicPr>
+                  <a:picLocks noChangeAspect="1"/>
+                </p:cNvPicPr>
+                <p:nvPr/>
+              </p:nvPicPr>
+              <p:blipFill>
+                <a:blip r:embed="rId3">
+                  <a:extLst>
+                    <a:ext uri="{28A0092B-C50C-407E-A947-70E740481C1C}">
+                      <a14:useLocalDpi xmlns:a14="http://schemas.microsoft.com/office/drawing/2010/main" val="0"/>
+                    </a:ext>
+                    <a:ext uri="{96DAC541-7B7A-43D3-8B79-37D633B846F1}">
+                      <asvg:svgBlip xmlns:asvg="http://schemas.microsoft.com/office/drawing/2016/SVG/main" r:embed="rId4"/>
+                    </a:ext>
+                  </a:extLst>
+                </a:blip>
+                <a:stretch>
+                  <a:fillRect/>
+                </a:stretch>
+              </p:blipFill>
+              <p:spPr>
+                <a:xfrm>
+                  <a:off x="5948920" y="2185122"/>
+                  <a:ext cx="2823475" cy="2823475"/>
+                </a:xfrm>
+                <a:prstGeom prst="rect">
+                  <a:avLst/>
+                </a:prstGeom>
+              </p:spPr>
+            </p:pic>
+          </p:grpSp>
+        </p:grpSp>
+        <p:grpSp>
+          <p:nvGrpSpPr>
+            <p:cNvPr id="17" name="Grupa 16">
+              <a:extLst>
+                <a:ext uri="{FF2B5EF4-FFF2-40B4-BE49-F238E27FC236}">
+                  <a16:creationId xmlns:a16="http://schemas.microsoft.com/office/drawing/2014/main" id="{8C694A27-5A78-4440-B7B6-1FD9848F4CB0}"/>
+                </a:ext>
+              </a:extLst>
+            </p:cNvPr>
+            <p:cNvGrpSpPr/>
+            <p:nvPr/>
+          </p:nvGrpSpPr>
+          <p:grpSpPr>
+            <a:xfrm>
+              <a:off x="819338" y="734449"/>
+              <a:ext cx="8699070" cy="5143369"/>
+              <a:chOff x="881090" y="937755"/>
+              <a:chExt cx="8699070" cy="5143369"/>
+            </a:xfrm>
+          </p:grpSpPr>
+          <p:sp>
+            <p:nvSpPr>
+              <p:cNvPr id="18" name="Strzałka: kolista 17">
+                <a:extLst>
+                  <a:ext uri="{FF2B5EF4-FFF2-40B4-BE49-F238E27FC236}">
+                    <a16:creationId xmlns:a16="http://schemas.microsoft.com/office/drawing/2014/main" id="{EEE27C09-A39D-43ED-AE36-F1E7298A3311}"/>
+                  </a:ext>
+                </a:extLst>
+              </p:cNvPr>
+              <p:cNvSpPr/>
+              <p:nvPr/>
+            </p:nvSpPr>
+            <p:spPr>
+              <a:xfrm rot="4232097">
+                <a:off x="4720754" y="1774172"/>
+                <a:ext cx="3989259" cy="3506544"/>
+              </a:xfrm>
+              <a:prstGeom prst="circularArrow">
+                <a:avLst>
+                  <a:gd name="adj1" fmla="val 17285"/>
+                  <a:gd name="adj2" fmla="val 817767"/>
+                  <a:gd name="adj3" fmla="val 20220068"/>
+                  <a:gd name="adj4" fmla="val 13674065"/>
+                  <a:gd name="adj5" fmla="val 13816"/>
+                </a:avLst>
+              </a:prstGeom>
+              <a:ln>
+                <a:noFill/>
+              </a:ln>
+            </p:spPr>
+            <p:style>
+              <a:lnRef idx="2">
+                <a:schemeClr val="accent6"/>
+              </a:lnRef>
+              <a:fillRef idx="1">
+                <a:schemeClr val="lt1"/>
+              </a:fillRef>
+              <a:effectRef idx="0">
+                <a:schemeClr val="accent6"/>
+              </a:effectRef>
+              <a:fontRef idx="minor">
+                <a:schemeClr val="dk1"/>
+              </a:fontRef>
+            </p:style>
+            <p:txBody>
+              <a:bodyPr rtlCol="0" anchor="ctr"/>
+              <a:lstStyle/>
+              <a:p>
+                <a:pPr algn="ctr"/>
+                <a:endParaRPr lang="pl-PL" dirty="0">
+                  <a:solidFill>
+                    <a:schemeClr val="tx1"/>
+                  </a:solidFill>
+                </a:endParaRPr>
+              </a:p>
+            </p:txBody>
+          </p:sp>
+          <p:sp>
+            <p:nvSpPr>
+              <p:cNvPr id="19" name="Strzałka: kolista 18">
+                <a:extLst>
+                  <a:ext uri="{FF2B5EF4-FFF2-40B4-BE49-F238E27FC236}">
+                    <a16:creationId xmlns:a16="http://schemas.microsoft.com/office/drawing/2014/main" id="{9E16B8BC-DFE5-4F8D-8C21-943900EB2B91}"/>
+                  </a:ext>
+                </a:extLst>
+              </p:cNvPr>
+              <p:cNvSpPr/>
+              <p:nvPr/>
+            </p:nvSpPr>
+            <p:spPr>
+              <a:xfrm rot="17588791">
+                <a:off x="4634487" y="2601821"/>
+                <a:ext cx="3356567" cy="3602040"/>
+              </a:xfrm>
+              <a:prstGeom prst="circularArrow">
+                <a:avLst>
+                  <a:gd name="adj1" fmla="val 17285"/>
+                  <a:gd name="adj2" fmla="val 817767"/>
+                  <a:gd name="adj3" fmla="val 20220068"/>
+                  <a:gd name="adj4" fmla="val 14902528"/>
+                  <a:gd name="adj5" fmla="val 13816"/>
+                </a:avLst>
+              </a:prstGeom>
+              <a:ln>
+                <a:noFill/>
+              </a:ln>
+            </p:spPr>
+            <p:style>
+              <a:lnRef idx="2">
+                <a:schemeClr val="accent6"/>
+              </a:lnRef>
+              <a:fillRef idx="1">
+                <a:schemeClr val="lt1"/>
+              </a:fillRef>
+              <a:effectRef idx="0">
+                <a:schemeClr val="accent6"/>
+              </a:effectRef>
+              <a:fontRef idx="minor">
+                <a:schemeClr val="dk1"/>
+              </a:fontRef>
+            </p:style>
+            <p:txBody>
+              <a:bodyPr rtlCol="0" anchor="ctr"/>
+              <a:lstStyle/>
+              <a:p>
+                <a:pPr algn="ctr"/>
+                <a:endParaRPr lang="pl-PL" dirty="0">
+                  <a:solidFill>
+                    <a:schemeClr val="tx1"/>
+                  </a:solidFill>
+                </a:endParaRPr>
+              </a:p>
+            </p:txBody>
+          </p:sp>
+          <p:grpSp>
+            <p:nvGrpSpPr>
+              <p:cNvPr id="20" name="Grupa 19">
+                <a:extLst>
+                  <a:ext uri="{FF2B5EF4-FFF2-40B4-BE49-F238E27FC236}">
+                    <a16:creationId xmlns:a16="http://schemas.microsoft.com/office/drawing/2014/main" id="{5792EEA4-478C-4549-9C47-6248FCA2472A}"/>
+                  </a:ext>
+                </a:extLst>
+              </p:cNvPr>
+              <p:cNvGrpSpPr/>
+              <p:nvPr/>
+            </p:nvGrpSpPr>
+            <p:grpSpPr>
+              <a:xfrm>
+                <a:off x="881090" y="937755"/>
+                <a:ext cx="8699070" cy="4841814"/>
+                <a:chOff x="73325" y="1052234"/>
+                <a:chExt cx="8699070" cy="4841814"/>
+              </a:xfrm>
+            </p:grpSpPr>
+            <p:sp>
+              <p:nvSpPr>
+                <p:cNvPr id="21" name="Strzałka: kolista 20">
+                  <a:extLst>
+                    <a:ext uri="{FF2B5EF4-FFF2-40B4-BE49-F238E27FC236}">
+                      <a16:creationId xmlns:a16="http://schemas.microsoft.com/office/drawing/2014/main" id="{BF61D56F-3E67-45C7-AEB4-267B863731D5}"/>
+                    </a:ext>
+                  </a:extLst>
+                </p:cNvPr>
+                <p:cNvSpPr/>
+                <p:nvPr/>
+              </p:nvSpPr>
+              <p:spPr>
+                <a:xfrm rot="19837530">
+                  <a:off x="3219102" y="1605390"/>
+                  <a:ext cx="3989259" cy="3506544"/>
+                </a:xfrm>
+                <a:prstGeom prst="circularArrow">
+                  <a:avLst>
+                    <a:gd name="adj1" fmla="val 17285"/>
+                    <a:gd name="adj2" fmla="val 817767"/>
+                    <a:gd name="adj3" fmla="val 20220068"/>
+                    <a:gd name="adj4" fmla="val 13674065"/>
+                    <a:gd name="adj5" fmla="val 13816"/>
+                  </a:avLst>
+                </a:prstGeom>
+                <a:ln>
+                  <a:noFill/>
+                </a:ln>
+              </p:spPr>
+              <p:style>
+                <a:lnRef idx="2">
+                  <a:schemeClr val="accent6"/>
+                </a:lnRef>
+                <a:fillRef idx="1">
+                  <a:schemeClr val="lt1"/>
+                </a:fillRef>
+                <a:effectRef idx="0">
+                  <a:schemeClr val="accent6"/>
+                </a:effectRef>
+                <a:fontRef idx="minor">
+                  <a:schemeClr val="dk1"/>
+                </a:fontRef>
+              </p:style>
+              <p:txBody>
+                <a:bodyPr rtlCol="0" anchor="ctr"/>
+                <a:lstStyle/>
+                <a:p>
+                  <a:pPr algn="ctr"/>
+                  <a:endParaRPr lang="pl-PL" dirty="0">
+                    <a:solidFill>
+                      <a:schemeClr val="tx1"/>
+                    </a:solidFill>
+                  </a:endParaRPr>
+                </a:p>
+              </p:txBody>
+            </p:sp>
+            <p:sp>
+              <p:nvSpPr>
+                <p:cNvPr id="22" name="Strzałka: kolista 21">
+                  <a:extLst>
+                    <a:ext uri="{FF2B5EF4-FFF2-40B4-BE49-F238E27FC236}">
+                      <a16:creationId xmlns:a16="http://schemas.microsoft.com/office/drawing/2014/main" id="{A31AB7C5-F4BD-47E7-897D-5B5237CED516}"/>
+                    </a:ext>
+                  </a:extLst>
+                </p:cNvPr>
+                <p:cNvSpPr/>
+                <p:nvPr/>
+              </p:nvSpPr>
+              <p:spPr>
+                <a:xfrm rot="10036440">
+                  <a:off x="3727731" y="2387504"/>
+                  <a:ext cx="3989259" cy="3506544"/>
+                </a:xfrm>
+                <a:prstGeom prst="circularArrow">
+                  <a:avLst>
+                    <a:gd name="adj1" fmla="val 17285"/>
+                    <a:gd name="adj2" fmla="val 817767"/>
+                    <a:gd name="adj3" fmla="val 20220068"/>
+                    <a:gd name="adj4" fmla="val 14902528"/>
+                    <a:gd name="adj5" fmla="val 13816"/>
+                  </a:avLst>
+                </a:prstGeom>
+                <a:ln>
+                  <a:noFill/>
+                </a:ln>
+              </p:spPr>
+              <p:style>
+                <a:lnRef idx="2">
+                  <a:schemeClr val="accent6"/>
+                </a:lnRef>
+                <a:fillRef idx="1">
+                  <a:schemeClr val="lt1"/>
+                </a:fillRef>
+                <a:effectRef idx="0">
+                  <a:schemeClr val="accent6"/>
+                </a:effectRef>
+                <a:fontRef idx="minor">
+                  <a:schemeClr val="dk1"/>
+                </a:fontRef>
+              </p:style>
+              <p:txBody>
+                <a:bodyPr rtlCol="0" anchor="ctr"/>
+                <a:lstStyle/>
+                <a:p>
+                  <a:pPr algn="ctr"/>
+                  <a:endParaRPr lang="pl-PL" dirty="0">
+                    <a:solidFill>
+                      <a:schemeClr val="tx1"/>
+                    </a:solidFill>
+                  </a:endParaRPr>
+                </a:p>
+              </p:txBody>
+            </p:sp>
+            <p:sp>
+              <p:nvSpPr>
+                <p:cNvPr id="23" name="Strzałka: kolista 22">
+                  <a:extLst>
+                    <a:ext uri="{FF2B5EF4-FFF2-40B4-BE49-F238E27FC236}">
+                      <a16:creationId xmlns:a16="http://schemas.microsoft.com/office/drawing/2014/main" id="{97B8FDEE-159F-4911-8A20-03F679E50BDA}"/>
+                    </a:ext>
+                  </a:extLst>
+                </p:cNvPr>
+                <p:cNvSpPr/>
+                <p:nvPr/>
+              </p:nvSpPr>
+              <p:spPr>
+                <a:xfrm rot="381463" flipV="1">
+                  <a:off x="73325" y="1052234"/>
+                  <a:ext cx="4285302" cy="3507415"/>
+                </a:xfrm>
+                <a:prstGeom prst="circularArrow">
+                  <a:avLst>
+                    <a:gd name="adj1" fmla="val 17285"/>
+                    <a:gd name="adj2" fmla="val 817767"/>
+                    <a:gd name="adj3" fmla="val 20220068"/>
+                    <a:gd name="adj4" fmla="val 15375350"/>
+                    <a:gd name="adj5" fmla="val 13816"/>
+                  </a:avLst>
+                </a:prstGeom>
+                <a:ln>
+                  <a:noFill/>
+                </a:ln>
+              </p:spPr>
+              <p:style>
+                <a:lnRef idx="2">
+                  <a:schemeClr val="accent6"/>
+                </a:lnRef>
+                <a:fillRef idx="1">
+                  <a:schemeClr val="lt1"/>
+                </a:fillRef>
+                <a:effectRef idx="0">
+                  <a:schemeClr val="accent6"/>
+                </a:effectRef>
+                <a:fontRef idx="minor">
+                  <a:schemeClr val="dk1"/>
+                </a:fontRef>
+              </p:style>
+              <p:txBody>
+                <a:bodyPr rtlCol="0" anchor="ctr"/>
+                <a:lstStyle/>
+                <a:p>
+                  <a:pPr algn="ctr"/>
+                  <a:endParaRPr lang="pl-PL" dirty="0">
+                    <a:solidFill>
+                      <a:schemeClr val="tx1"/>
+                    </a:solidFill>
+                  </a:endParaRPr>
+                </a:p>
+              </p:txBody>
+            </p:sp>
+            <p:pic>
+              <p:nvPicPr>
+                <p:cNvPr id="24" name="Grafika 23" descr="Strzałka: lekko zakrzywiona">
+                  <a:extLst>
+                    <a:ext uri="{FF2B5EF4-FFF2-40B4-BE49-F238E27FC236}">
+                      <a16:creationId xmlns:a16="http://schemas.microsoft.com/office/drawing/2014/main" id="{FCF2D6A2-1E02-4472-868D-8FFB35AAC919}"/>
+                    </a:ext>
+                  </a:extLst>
+                </p:cNvPr>
+                <p:cNvPicPr>
+                  <a:picLocks noChangeAspect="1"/>
+                </p:cNvPicPr>
+                <p:nvPr/>
+              </p:nvPicPr>
+              <p:blipFill>
+                <a:blip r:embed="rId5">
+                  <a:extLst>
+                    <a:ext uri="{28A0092B-C50C-407E-A947-70E740481C1C}">
+                      <a14:useLocalDpi xmlns:a14="http://schemas.microsoft.com/office/drawing/2010/main" val="0"/>
+                    </a:ext>
+                    <a:ext uri="{96DAC541-7B7A-43D3-8B79-37D633B846F1}">
+                      <asvg:svgBlip xmlns:asvg="http://schemas.microsoft.com/office/drawing/2016/SVG/main" r:embed="rId6"/>
+                    </a:ext>
+                  </a:extLst>
+                </a:blip>
+                <a:stretch>
+                  <a:fillRect/>
+                </a:stretch>
+              </p:blipFill>
+              <p:spPr>
+                <a:xfrm>
+                  <a:off x="5948920" y="2185122"/>
+                  <a:ext cx="2823475" cy="2823475"/>
+                </a:xfrm>
+                <a:prstGeom prst="rect">
+                  <a:avLst/>
+                </a:prstGeom>
+              </p:spPr>
+            </p:pic>
+          </p:grpSp>
+        </p:grpSp>
+      </p:grpSp>
+      <p:grpSp>
+        <p:nvGrpSpPr>
+          <p:cNvPr id="26" name="Grupa 25">
+            <a:extLst>
+              <a:ext uri="{FF2B5EF4-FFF2-40B4-BE49-F238E27FC236}">
+                <a16:creationId xmlns:a16="http://schemas.microsoft.com/office/drawing/2014/main" id="{0E0124E5-D63E-419B-91BB-173A25539046}"/>
+              </a:ext>
+            </a:extLst>
+          </p:cNvPr>
+          <p:cNvGrpSpPr/>
+          <p:nvPr/>
+        </p:nvGrpSpPr>
+        <p:grpSpPr>
+          <a:xfrm>
+            <a:off x="9447453" y="2251101"/>
+            <a:ext cx="2523997" cy="2453162"/>
+            <a:chOff x="861707" y="2858139"/>
+            <a:chExt cx="2523997" cy="2453162"/>
+          </a:xfrm>
+        </p:grpSpPr>
+        <p:grpSp>
+          <p:nvGrpSpPr>
+            <p:cNvPr id="27" name="Grupa 26">
+              <a:extLst>
+                <a:ext uri="{FF2B5EF4-FFF2-40B4-BE49-F238E27FC236}">
+                  <a16:creationId xmlns:a16="http://schemas.microsoft.com/office/drawing/2014/main" id="{39D6EF77-CCD6-4BEA-90BD-E9E3F07A449A}"/>
+                </a:ext>
+              </a:extLst>
+            </p:cNvPr>
+            <p:cNvGrpSpPr/>
+            <p:nvPr/>
+          </p:nvGrpSpPr>
+          <p:grpSpPr>
+            <a:xfrm>
+              <a:off x="882424" y="2974238"/>
+              <a:ext cx="2503280" cy="2337063"/>
+              <a:chOff x="901148" y="2166492"/>
+              <a:chExt cx="2503280" cy="2337063"/>
+            </a:xfrm>
+          </p:grpSpPr>
+          <p:pic>
+            <p:nvPicPr>
+              <p:cNvPr id="31" name="Grafika 30" descr="Koła zębate">
+                <a:extLst>
+                  <a:ext uri="{FF2B5EF4-FFF2-40B4-BE49-F238E27FC236}">
+                    <a16:creationId xmlns:a16="http://schemas.microsoft.com/office/drawing/2014/main" id="{177F32B4-75CC-427C-842A-5149E8E08450}"/>
+                  </a:ext>
+                </a:extLst>
+              </p:cNvPr>
+              <p:cNvPicPr>
+                <a:picLocks noChangeAspect="1"/>
+              </p:cNvPicPr>
+              <p:nvPr/>
+            </p:nvPicPr>
+            <p:blipFill>
+              <a:blip r:embed="rId7">
+                <a:extLst>
+                  <a:ext uri="{28A0092B-C50C-407E-A947-70E740481C1C}">
+                    <a14:useLocalDpi xmlns:a14="http://schemas.microsoft.com/office/drawing/2010/main" val="0"/>
+                  </a:ext>
+                  <a:ext uri="{96DAC541-7B7A-43D3-8B79-37D633B846F1}">
+                    <asvg:svgBlip xmlns:asvg="http://schemas.microsoft.com/office/drawing/2016/SVG/main" r:embed="rId8"/>
+                  </a:ext>
+                </a:extLst>
+              </a:blip>
+              <a:stretch>
+                <a:fillRect/>
+              </a:stretch>
+            </p:blipFill>
+            <p:spPr>
+              <a:xfrm>
+                <a:off x="1846386" y="2945513"/>
+                <a:ext cx="1558042" cy="1558042"/>
+              </a:xfrm>
+              <a:prstGeom prst="rect">
+                <a:avLst/>
+              </a:prstGeom>
+            </p:spPr>
+          </p:pic>
+          <p:pic>
+            <p:nvPicPr>
+              <p:cNvPr id="32" name="Grafika 31" descr="Pojedyncze koło zębate">
+                <a:extLst>
+                  <a:ext uri="{FF2B5EF4-FFF2-40B4-BE49-F238E27FC236}">
+                    <a16:creationId xmlns:a16="http://schemas.microsoft.com/office/drawing/2014/main" id="{30702EB1-E19E-4AE5-A952-6636AD536799}"/>
+                  </a:ext>
+                </a:extLst>
+              </p:cNvPr>
+              <p:cNvPicPr>
+                <a:picLocks noChangeAspect="1"/>
+              </p:cNvPicPr>
+              <p:nvPr/>
+            </p:nvPicPr>
+            <p:blipFill>
+              <a:blip r:embed="rId9">
+                <a:extLst>
+                  <a:ext uri="{28A0092B-C50C-407E-A947-70E740481C1C}">
+                    <a14:useLocalDpi xmlns:a14="http://schemas.microsoft.com/office/drawing/2010/main" val="0"/>
+                  </a:ext>
+                  <a:ext uri="{96DAC541-7B7A-43D3-8B79-37D633B846F1}">
+                    <asvg:svgBlip xmlns:asvg="http://schemas.microsoft.com/office/drawing/2016/SVG/main" r:embed="rId10"/>
+                  </a:ext>
+                </a:extLst>
+              </a:blip>
+              <a:stretch>
+                <a:fillRect/>
+              </a:stretch>
+            </p:blipFill>
+            <p:spPr>
+              <a:xfrm>
+                <a:off x="901148" y="2166492"/>
+                <a:ext cx="1558042" cy="1558042"/>
+              </a:xfrm>
+              <a:prstGeom prst="rect">
+                <a:avLst/>
+              </a:prstGeom>
+            </p:spPr>
+          </p:pic>
+        </p:grpSp>
+        <p:grpSp>
+          <p:nvGrpSpPr>
+            <p:cNvPr id="28" name="Grupa 27">
+              <a:extLst>
+                <a:ext uri="{FF2B5EF4-FFF2-40B4-BE49-F238E27FC236}">
+                  <a16:creationId xmlns:a16="http://schemas.microsoft.com/office/drawing/2014/main" id="{B5DB4A95-4C68-47E0-BBD1-BD1C2E9E51BE}"/>
+                </a:ext>
+              </a:extLst>
+            </p:cNvPr>
+            <p:cNvGrpSpPr/>
+            <p:nvPr/>
+          </p:nvGrpSpPr>
+          <p:grpSpPr>
+            <a:xfrm>
+              <a:off x="861707" y="2858139"/>
+              <a:ext cx="2503280" cy="2337063"/>
+              <a:chOff x="901148" y="2166492"/>
+              <a:chExt cx="2503280" cy="2337063"/>
+            </a:xfrm>
+            <a:solidFill>
+              <a:schemeClr val="bg1"/>
+            </a:solidFill>
+          </p:grpSpPr>
+          <p:pic>
+            <p:nvPicPr>
+              <p:cNvPr id="29" name="Grafika 28" descr="Koła zębate">
+                <a:extLst>
+                  <a:ext uri="{FF2B5EF4-FFF2-40B4-BE49-F238E27FC236}">
+                    <a16:creationId xmlns:a16="http://schemas.microsoft.com/office/drawing/2014/main" id="{3B486982-8948-4DAF-A0ED-298E7AD7EA02}"/>
+                  </a:ext>
+                </a:extLst>
+              </p:cNvPr>
+              <p:cNvPicPr>
+                <a:picLocks noChangeAspect="1"/>
+              </p:cNvPicPr>
+              <p:nvPr/>
+            </p:nvPicPr>
+            <p:blipFill>
+              <a:blip r:embed="rId11">
+                <a:extLst>
+                  <a:ext uri="{28A0092B-C50C-407E-A947-70E740481C1C}">
+                    <a14:useLocalDpi xmlns:a14="http://schemas.microsoft.com/office/drawing/2010/main" val="0"/>
+                  </a:ext>
+                  <a:ext uri="{96DAC541-7B7A-43D3-8B79-37D633B846F1}">
+                    <asvg:svgBlip xmlns:asvg="http://schemas.microsoft.com/office/drawing/2016/SVG/main" r:embed="rId12"/>
+                  </a:ext>
+                </a:extLst>
+              </a:blip>
+              <a:stretch>
+                <a:fillRect/>
+              </a:stretch>
+            </p:blipFill>
+            <p:spPr>
+              <a:xfrm>
+                <a:off x="1846386" y="2945513"/>
+                <a:ext cx="1558042" cy="1558042"/>
+              </a:xfrm>
+              <a:prstGeom prst="rect">
+                <a:avLst/>
+              </a:prstGeom>
+            </p:spPr>
+          </p:pic>
+          <p:pic>
+            <p:nvPicPr>
+              <p:cNvPr id="30" name="Grafika 29" descr="Pojedyncze koło zębate">
+                <a:extLst>
+                  <a:ext uri="{FF2B5EF4-FFF2-40B4-BE49-F238E27FC236}">
+                    <a16:creationId xmlns:a16="http://schemas.microsoft.com/office/drawing/2014/main" id="{4757B2F1-6FBB-4962-B040-D334BA3C67CD}"/>
+                  </a:ext>
+                </a:extLst>
+              </p:cNvPr>
+              <p:cNvPicPr>
+                <a:picLocks noChangeAspect="1"/>
+              </p:cNvPicPr>
+              <p:nvPr/>
+            </p:nvPicPr>
+            <p:blipFill>
+              <a:blip r:embed="rId13">
+                <a:extLst>
+                  <a:ext uri="{28A0092B-C50C-407E-A947-70E740481C1C}">
+                    <a14:useLocalDpi xmlns:a14="http://schemas.microsoft.com/office/drawing/2010/main" val="0"/>
+                  </a:ext>
+                  <a:ext uri="{96DAC541-7B7A-43D3-8B79-37D633B846F1}">
+                    <asvg:svgBlip xmlns:asvg="http://schemas.microsoft.com/office/drawing/2016/SVG/main" r:embed="rId14"/>
+                  </a:ext>
+                </a:extLst>
+              </a:blip>
+              <a:stretch>
+                <a:fillRect/>
+              </a:stretch>
+            </p:blipFill>
+            <p:spPr>
+              <a:xfrm>
+                <a:off x="901148" y="2166492"/>
+                <a:ext cx="1558042" cy="1558042"/>
+              </a:xfrm>
+              <a:prstGeom prst="rect">
+                <a:avLst/>
+              </a:prstGeom>
+            </p:spPr>
+          </p:pic>
+        </p:grpSp>
+      </p:grpSp>
+      <p:grpSp>
+        <p:nvGrpSpPr>
+          <p:cNvPr id="35" name="Grupa 34">
+            <a:extLst>
+              <a:ext uri="{FF2B5EF4-FFF2-40B4-BE49-F238E27FC236}">
+                <a16:creationId xmlns:a16="http://schemas.microsoft.com/office/drawing/2014/main" id="{ADF4632D-6F1A-4FF7-8E9E-3FE6935A48B7}"/>
+              </a:ext>
+            </a:extLst>
+          </p:cNvPr>
+          <p:cNvGrpSpPr/>
+          <p:nvPr/>
+        </p:nvGrpSpPr>
+        <p:grpSpPr>
+          <a:xfrm>
+            <a:off x="574211" y="1828650"/>
+            <a:ext cx="1196530" cy="512517"/>
+            <a:chOff x="626022" y="2084909"/>
+            <a:chExt cx="1196530" cy="512517"/>
+          </a:xfrm>
+        </p:grpSpPr>
+        <p:sp>
+          <p:nvSpPr>
+            <p:cNvPr id="33" name="Prostokąt: zaokrąglone rogi 32">
+              <a:extLst>
+                <a:ext uri="{FF2B5EF4-FFF2-40B4-BE49-F238E27FC236}">
+                  <a16:creationId xmlns:a16="http://schemas.microsoft.com/office/drawing/2014/main" id="{AC28E6EC-5C3E-4BBD-8776-B7EB71BD445F}"/>
+                </a:ext>
+              </a:extLst>
+            </p:cNvPr>
+            <p:cNvSpPr/>
+            <p:nvPr/>
+          </p:nvSpPr>
+          <p:spPr>
+            <a:xfrm>
+              <a:off x="675861" y="2143099"/>
+              <a:ext cx="1146691" cy="454327"/>
+            </a:xfrm>
+            <a:prstGeom prst="roundRect">
+              <a:avLst/>
+            </a:prstGeom>
+            <a:ln/>
+          </p:spPr>
+          <p:style>
+            <a:lnRef idx="2">
+              <a:schemeClr val="dk1">
+                <a:shade val="50000"/>
+              </a:schemeClr>
+            </a:lnRef>
+            <a:fillRef idx="1">
+              <a:schemeClr val="dk1"/>
+            </a:fillRef>
+            <a:effectRef idx="0">
+              <a:schemeClr val="dk1"/>
+            </a:effectRef>
+            <a:fontRef idx="minor">
+              <a:schemeClr val="lt1"/>
+            </a:fontRef>
+          </p:style>
+          <p:txBody>
+            <a:bodyPr rtlCol="0" anchor="ctr"/>
+            <a:lstStyle/>
+            <a:p>
+              <a:pPr algn="ctr"/>
+              <a:endParaRPr lang="pl-PL"/>
+            </a:p>
+          </p:txBody>
+        </p:sp>
+        <p:sp>
+          <p:nvSpPr>
+            <p:cNvPr id="34" name="Prostokąt: zaokrąglone rogi 33">
+              <a:extLst>
+                <a:ext uri="{FF2B5EF4-FFF2-40B4-BE49-F238E27FC236}">
+                  <a16:creationId xmlns:a16="http://schemas.microsoft.com/office/drawing/2014/main" id="{4C55121C-DFFE-489A-8DFA-0B3D73072F5A}"/>
+                </a:ext>
+              </a:extLst>
+            </p:cNvPr>
+            <p:cNvSpPr/>
+            <p:nvPr/>
+          </p:nvSpPr>
+          <p:spPr>
+            <a:xfrm>
+              <a:off x="626022" y="2084909"/>
+              <a:ext cx="1146691" cy="454327"/>
+            </a:xfrm>
+            <a:prstGeom prst="roundRect">
+              <a:avLst/>
+            </a:prstGeom>
+            <a:ln>
+              <a:noFill/>
+            </a:ln>
+          </p:spPr>
+          <p:style>
+            <a:lnRef idx="2">
+              <a:schemeClr val="accent6"/>
+            </a:lnRef>
+            <a:fillRef idx="1">
+              <a:schemeClr val="lt1"/>
+            </a:fillRef>
+            <a:effectRef idx="0">
+              <a:schemeClr val="accent6"/>
+            </a:effectRef>
+            <a:fontRef idx="minor">
+              <a:schemeClr val="dk1"/>
+            </a:fontRef>
+          </p:style>
+          <p:txBody>
+            <a:bodyPr rtlCol="0" anchor="ctr"/>
+            <a:lstStyle/>
+            <a:p>
+              <a:pPr algn="ctr"/>
+              <a:endParaRPr lang="pl-PL"/>
+            </a:p>
+          </p:txBody>
+        </p:sp>
+      </p:grpSp>
+      <p:grpSp>
+        <p:nvGrpSpPr>
+          <p:cNvPr id="36" name="Grupa 35">
+            <a:extLst>
+              <a:ext uri="{FF2B5EF4-FFF2-40B4-BE49-F238E27FC236}">
+                <a16:creationId xmlns:a16="http://schemas.microsoft.com/office/drawing/2014/main" id="{776B8FE4-F0A9-41DF-9830-33EF22AB4C48}"/>
+              </a:ext>
+            </a:extLst>
+          </p:cNvPr>
+          <p:cNvGrpSpPr/>
+          <p:nvPr/>
+        </p:nvGrpSpPr>
+        <p:grpSpPr>
+          <a:xfrm>
+            <a:off x="574211" y="4848092"/>
+            <a:ext cx="1196530" cy="512517"/>
+            <a:chOff x="626022" y="2084909"/>
+            <a:chExt cx="1196530" cy="512517"/>
+          </a:xfrm>
+        </p:grpSpPr>
+        <p:sp>
+          <p:nvSpPr>
+            <p:cNvPr id="37" name="Prostokąt: zaokrąglone rogi 36">
+              <a:extLst>
+                <a:ext uri="{FF2B5EF4-FFF2-40B4-BE49-F238E27FC236}">
+                  <a16:creationId xmlns:a16="http://schemas.microsoft.com/office/drawing/2014/main" id="{F23F96B6-943B-4EC6-A593-5B4F774DA923}"/>
+                </a:ext>
+              </a:extLst>
+            </p:cNvPr>
+            <p:cNvSpPr/>
+            <p:nvPr/>
+          </p:nvSpPr>
+          <p:spPr>
+            <a:xfrm>
+              <a:off x="675861" y="2143099"/>
+              <a:ext cx="1146691" cy="454327"/>
+            </a:xfrm>
+            <a:prstGeom prst="roundRect">
+              <a:avLst/>
+            </a:prstGeom>
+            <a:ln/>
+          </p:spPr>
+          <p:style>
+            <a:lnRef idx="2">
+              <a:schemeClr val="dk1">
+                <a:shade val="50000"/>
+              </a:schemeClr>
+            </a:lnRef>
+            <a:fillRef idx="1">
+              <a:schemeClr val="dk1"/>
+            </a:fillRef>
+            <a:effectRef idx="0">
+              <a:schemeClr val="dk1"/>
+            </a:effectRef>
+            <a:fontRef idx="minor">
+              <a:schemeClr val="lt1"/>
+            </a:fontRef>
+          </p:style>
+          <p:txBody>
+            <a:bodyPr rtlCol="0" anchor="ctr"/>
+            <a:lstStyle/>
+            <a:p>
+              <a:pPr algn="ctr"/>
+              <a:endParaRPr lang="pl-PL"/>
+            </a:p>
+          </p:txBody>
+        </p:sp>
+        <p:sp>
+          <p:nvSpPr>
+            <p:cNvPr id="38" name="Prostokąt: zaokrąglone rogi 37">
+              <a:extLst>
+                <a:ext uri="{FF2B5EF4-FFF2-40B4-BE49-F238E27FC236}">
+                  <a16:creationId xmlns:a16="http://schemas.microsoft.com/office/drawing/2014/main" id="{902D3FCE-F640-4747-8947-FB948518B0ED}"/>
+                </a:ext>
+              </a:extLst>
+            </p:cNvPr>
+            <p:cNvSpPr/>
+            <p:nvPr/>
+          </p:nvSpPr>
+          <p:spPr>
+            <a:xfrm>
+              <a:off x="626022" y="2084909"/>
+              <a:ext cx="1146691" cy="454327"/>
+            </a:xfrm>
+            <a:prstGeom prst="roundRect">
+              <a:avLst/>
+            </a:prstGeom>
+            <a:ln>
+              <a:noFill/>
+            </a:ln>
+          </p:spPr>
+          <p:style>
+            <a:lnRef idx="2">
+              <a:schemeClr val="accent6"/>
+            </a:lnRef>
+            <a:fillRef idx="1">
+              <a:schemeClr val="lt1"/>
+            </a:fillRef>
+            <a:effectRef idx="0">
+              <a:schemeClr val="accent6"/>
+            </a:effectRef>
+            <a:fontRef idx="minor">
+              <a:schemeClr val="dk1"/>
+            </a:fontRef>
+          </p:style>
+          <p:txBody>
+            <a:bodyPr rtlCol="0" anchor="ctr"/>
+            <a:lstStyle/>
+            <a:p>
+              <a:pPr algn="ctr"/>
+              <a:endParaRPr lang="pl-PL"/>
+            </a:p>
+          </p:txBody>
+        </p:sp>
+      </p:grpSp>
+      <p:grpSp>
+        <p:nvGrpSpPr>
+          <p:cNvPr id="39" name="Grupa 38">
+            <a:extLst>
+              <a:ext uri="{FF2B5EF4-FFF2-40B4-BE49-F238E27FC236}">
+                <a16:creationId xmlns:a16="http://schemas.microsoft.com/office/drawing/2014/main" id="{8CFADE1B-6127-4196-A5A2-657A8C10B703}"/>
+              </a:ext>
+            </a:extLst>
+          </p:cNvPr>
+          <p:cNvGrpSpPr/>
+          <p:nvPr/>
+        </p:nvGrpSpPr>
+        <p:grpSpPr>
+          <a:xfrm>
+            <a:off x="574211" y="2506088"/>
+            <a:ext cx="1196530" cy="512517"/>
+            <a:chOff x="626022" y="2084909"/>
+            <a:chExt cx="1196530" cy="512517"/>
+          </a:xfrm>
+        </p:grpSpPr>
+        <p:sp>
+          <p:nvSpPr>
+            <p:cNvPr id="40" name="Prostokąt: zaokrąglone rogi 39">
+              <a:extLst>
+                <a:ext uri="{FF2B5EF4-FFF2-40B4-BE49-F238E27FC236}">
+                  <a16:creationId xmlns:a16="http://schemas.microsoft.com/office/drawing/2014/main" id="{2AFD60D8-A15F-459B-AC5A-5B428E89D891}"/>
+                </a:ext>
+              </a:extLst>
+            </p:cNvPr>
+            <p:cNvSpPr/>
+            <p:nvPr/>
+          </p:nvSpPr>
+          <p:spPr>
+            <a:xfrm>
+              <a:off x="675861" y="2143099"/>
+              <a:ext cx="1146691" cy="454327"/>
+            </a:xfrm>
+            <a:prstGeom prst="roundRect">
+              <a:avLst/>
+            </a:prstGeom>
+            <a:ln/>
+          </p:spPr>
+          <p:style>
+            <a:lnRef idx="2">
+              <a:schemeClr val="dk1">
+                <a:shade val="50000"/>
+              </a:schemeClr>
+            </a:lnRef>
+            <a:fillRef idx="1">
+              <a:schemeClr val="dk1"/>
+            </a:fillRef>
+            <a:effectRef idx="0">
+              <a:schemeClr val="dk1"/>
+            </a:effectRef>
+            <a:fontRef idx="minor">
+              <a:schemeClr val="lt1"/>
+            </a:fontRef>
+          </p:style>
+          <p:txBody>
+            <a:bodyPr rtlCol="0" anchor="ctr"/>
+            <a:lstStyle/>
+            <a:p>
+              <a:pPr algn="ctr"/>
+              <a:endParaRPr lang="pl-PL"/>
+            </a:p>
+          </p:txBody>
+        </p:sp>
+        <p:sp>
+          <p:nvSpPr>
+            <p:cNvPr id="41" name="Prostokąt: zaokrąglone rogi 40">
+              <a:extLst>
+                <a:ext uri="{FF2B5EF4-FFF2-40B4-BE49-F238E27FC236}">
+                  <a16:creationId xmlns:a16="http://schemas.microsoft.com/office/drawing/2014/main" id="{14C5D276-FB4A-4E1F-A49A-29AF183DCDFB}"/>
+                </a:ext>
+              </a:extLst>
+            </p:cNvPr>
+            <p:cNvSpPr/>
+            <p:nvPr/>
+          </p:nvSpPr>
+          <p:spPr>
+            <a:xfrm>
+              <a:off x="626022" y="2084909"/>
+              <a:ext cx="1146691" cy="454327"/>
+            </a:xfrm>
+            <a:prstGeom prst="roundRect">
+              <a:avLst/>
+            </a:prstGeom>
+            <a:ln>
+              <a:noFill/>
+            </a:ln>
+          </p:spPr>
+          <p:style>
+            <a:lnRef idx="2">
+              <a:schemeClr val="accent6"/>
+            </a:lnRef>
+            <a:fillRef idx="1">
+              <a:schemeClr val="lt1"/>
+            </a:fillRef>
+            <a:effectRef idx="0">
+              <a:schemeClr val="accent6"/>
+            </a:effectRef>
+            <a:fontRef idx="minor">
+              <a:schemeClr val="dk1"/>
+            </a:fontRef>
+          </p:style>
+          <p:txBody>
+            <a:bodyPr rtlCol="0" anchor="ctr"/>
+            <a:lstStyle/>
+            <a:p>
+              <a:pPr algn="ctr"/>
+              <a:endParaRPr lang="pl-PL"/>
+            </a:p>
+          </p:txBody>
+        </p:sp>
+      </p:grpSp>
+      <p:grpSp>
+        <p:nvGrpSpPr>
+          <p:cNvPr id="42" name="Grupa 41">
+            <a:extLst>
+              <a:ext uri="{FF2B5EF4-FFF2-40B4-BE49-F238E27FC236}">
+                <a16:creationId xmlns:a16="http://schemas.microsoft.com/office/drawing/2014/main" id="{895D51EC-D193-40AF-9C56-06BF09A7BFA3}"/>
+              </a:ext>
+            </a:extLst>
+          </p:cNvPr>
+          <p:cNvGrpSpPr/>
+          <p:nvPr/>
+        </p:nvGrpSpPr>
+        <p:grpSpPr>
+          <a:xfrm>
+            <a:off x="1272651" y="3298167"/>
+            <a:ext cx="1196530" cy="512517"/>
+            <a:chOff x="626022" y="2084909"/>
+            <a:chExt cx="1196530" cy="512517"/>
+          </a:xfrm>
+        </p:grpSpPr>
+        <p:sp>
+          <p:nvSpPr>
+            <p:cNvPr id="43" name="Prostokąt: zaokrąglone rogi 42">
+              <a:extLst>
+                <a:ext uri="{FF2B5EF4-FFF2-40B4-BE49-F238E27FC236}">
+                  <a16:creationId xmlns:a16="http://schemas.microsoft.com/office/drawing/2014/main" id="{00DCDF0E-727D-4BF5-9DF5-D8BA48A388AD}"/>
+                </a:ext>
+              </a:extLst>
+            </p:cNvPr>
+            <p:cNvSpPr/>
+            <p:nvPr/>
+          </p:nvSpPr>
+          <p:spPr>
+            <a:xfrm>
+              <a:off x="675861" y="2143099"/>
+              <a:ext cx="1146691" cy="454327"/>
+            </a:xfrm>
+            <a:prstGeom prst="roundRect">
+              <a:avLst/>
+            </a:prstGeom>
+            <a:ln/>
+          </p:spPr>
+          <p:style>
+            <a:lnRef idx="2">
+              <a:schemeClr val="dk1">
+                <a:shade val="50000"/>
+              </a:schemeClr>
+            </a:lnRef>
+            <a:fillRef idx="1">
+              <a:schemeClr val="dk1"/>
+            </a:fillRef>
+            <a:effectRef idx="0">
+              <a:schemeClr val="dk1"/>
+            </a:effectRef>
+            <a:fontRef idx="minor">
+              <a:schemeClr val="lt1"/>
+            </a:fontRef>
+          </p:style>
+          <p:txBody>
+            <a:bodyPr rtlCol="0" anchor="ctr"/>
+            <a:lstStyle/>
+            <a:p>
+              <a:pPr algn="ctr"/>
+              <a:endParaRPr lang="pl-PL"/>
+            </a:p>
+          </p:txBody>
+        </p:sp>
+        <p:sp>
+          <p:nvSpPr>
+            <p:cNvPr id="44" name="Prostokąt: zaokrąglone rogi 43">
+              <a:extLst>
+                <a:ext uri="{FF2B5EF4-FFF2-40B4-BE49-F238E27FC236}">
+                  <a16:creationId xmlns:a16="http://schemas.microsoft.com/office/drawing/2014/main" id="{FD3B46F1-26CF-4D3B-8DBF-DB717B63D940}"/>
+                </a:ext>
+              </a:extLst>
+            </p:cNvPr>
+            <p:cNvSpPr/>
+            <p:nvPr/>
+          </p:nvSpPr>
+          <p:spPr>
+            <a:xfrm>
+              <a:off x="626022" y="2084909"/>
+              <a:ext cx="1146691" cy="454327"/>
+            </a:xfrm>
+            <a:prstGeom prst="roundRect">
+              <a:avLst/>
+            </a:prstGeom>
+            <a:ln>
+              <a:noFill/>
+            </a:ln>
+          </p:spPr>
+          <p:style>
+            <a:lnRef idx="2">
+              <a:schemeClr val="accent6"/>
+            </a:lnRef>
+            <a:fillRef idx="1">
+              <a:schemeClr val="lt1"/>
+            </a:fillRef>
+            <a:effectRef idx="0">
+              <a:schemeClr val="accent6"/>
+            </a:effectRef>
+            <a:fontRef idx="minor">
+              <a:schemeClr val="dk1"/>
+            </a:fontRef>
+          </p:style>
+          <p:txBody>
+            <a:bodyPr rtlCol="0" anchor="ctr"/>
+            <a:lstStyle/>
+            <a:p>
+              <a:pPr algn="ctr"/>
+              <a:endParaRPr lang="pl-PL"/>
+            </a:p>
+          </p:txBody>
+        </p:sp>
+      </p:grpSp>
+      <p:grpSp>
+        <p:nvGrpSpPr>
+          <p:cNvPr id="45" name="Grupa 44">
+            <a:extLst>
+              <a:ext uri="{FF2B5EF4-FFF2-40B4-BE49-F238E27FC236}">
+                <a16:creationId xmlns:a16="http://schemas.microsoft.com/office/drawing/2014/main" id="{298BB48C-5163-4C6A-8B83-64444EFB2793}"/>
+              </a:ext>
+            </a:extLst>
+          </p:cNvPr>
+          <p:cNvGrpSpPr/>
+          <p:nvPr/>
+        </p:nvGrpSpPr>
+        <p:grpSpPr>
+          <a:xfrm>
+            <a:off x="574211" y="4090246"/>
+            <a:ext cx="1196530" cy="512517"/>
+            <a:chOff x="626022" y="2084909"/>
+            <a:chExt cx="1196530" cy="512517"/>
+          </a:xfrm>
+        </p:grpSpPr>
+        <p:sp>
+          <p:nvSpPr>
+            <p:cNvPr id="46" name="Prostokąt: zaokrąglone rogi 45">
+              <a:extLst>
+                <a:ext uri="{FF2B5EF4-FFF2-40B4-BE49-F238E27FC236}">
+                  <a16:creationId xmlns:a16="http://schemas.microsoft.com/office/drawing/2014/main" id="{145F991F-79B2-4564-A75F-07474B0205B0}"/>
+                </a:ext>
+              </a:extLst>
+            </p:cNvPr>
+            <p:cNvSpPr/>
+            <p:nvPr/>
+          </p:nvSpPr>
+          <p:spPr>
+            <a:xfrm>
+              <a:off x="675861" y="2143099"/>
+              <a:ext cx="1146691" cy="454327"/>
+            </a:xfrm>
+            <a:prstGeom prst="roundRect">
+              <a:avLst/>
+            </a:prstGeom>
+            <a:ln/>
+          </p:spPr>
+          <p:style>
+            <a:lnRef idx="2">
+              <a:schemeClr val="dk1">
+                <a:shade val="50000"/>
+              </a:schemeClr>
+            </a:lnRef>
+            <a:fillRef idx="1">
+              <a:schemeClr val="dk1"/>
+            </a:fillRef>
+            <a:effectRef idx="0">
+              <a:schemeClr val="dk1"/>
+            </a:effectRef>
+            <a:fontRef idx="minor">
+              <a:schemeClr val="lt1"/>
+            </a:fontRef>
+          </p:style>
+          <p:txBody>
+            <a:bodyPr rtlCol="0" anchor="ctr"/>
+            <a:lstStyle/>
+            <a:p>
+              <a:pPr algn="ctr"/>
+              <a:endParaRPr lang="pl-PL"/>
+            </a:p>
+          </p:txBody>
+        </p:sp>
+        <p:sp>
+          <p:nvSpPr>
+            <p:cNvPr id="47" name="Prostokąt: zaokrąglone rogi 46">
+              <a:extLst>
+                <a:ext uri="{FF2B5EF4-FFF2-40B4-BE49-F238E27FC236}">
+                  <a16:creationId xmlns:a16="http://schemas.microsoft.com/office/drawing/2014/main" id="{BF0DB9B8-9D69-446E-B978-C039361DB19F}"/>
+                </a:ext>
+              </a:extLst>
+            </p:cNvPr>
+            <p:cNvSpPr/>
+            <p:nvPr/>
+          </p:nvSpPr>
+          <p:spPr>
+            <a:xfrm>
+              <a:off x="626022" y="2084909"/>
+              <a:ext cx="1146691" cy="454327"/>
+            </a:xfrm>
+            <a:prstGeom prst="roundRect">
+              <a:avLst/>
+            </a:prstGeom>
+            <a:ln>
+              <a:noFill/>
+            </a:ln>
+          </p:spPr>
+          <p:style>
+            <a:lnRef idx="2">
+              <a:schemeClr val="accent6"/>
+            </a:lnRef>
+            <a:fillRef idx="1">
+              <a:schemeClr val="lt1"/>
+            </a:fillRef>
+            <a:effectRef idx="0">
+              <a:schemeClr val="accent6"/>
+            </a:effectRef>
+            <a:fontRef idx="minor">
+              <a:schemeClr val="dk1"/>
+            </a:fontRef>
+          </p:style>
+          <p:txBody>
+            <a:bodyPr rtlCol="0" anchor="ctr"/>
+            <a:lstStyle/>
+            <a:p>
+              <a:pPr algn="ctr"/>
+              <a:endParaRPr lang="pl-PL"/>
+            </a:p>
+          </p:txBody>
+        </p:sp>
+      </p:grpSp>
+      <p:sp>
+        <p:nvSpPr>
+          <p:cNvPr id="48" name="Prostokąt 47">
+            <a:extLst>
+              <a:ext uri="{FF2B5EF4-FFF2-40B4-BE49-F238E27FC236}">
+                <a16:creationId xmlns:a16="http://schemas.microsoft.com/office/drawing/2014/main" id="{8F951DAA-A36D-48DE-8AEC-40985F34D0A5}"/>
+              </a:ext>
+            </a:extLst>
+          </p:cNvPr>
+          <p:cNvSpPr/>
+          <p:nvPr/>
+        </p:nvSpPr>
+        <p:spPr>
+          <a:xfrm>
+            <a:off x="168049" y="5708398"/>
+            <a:ext cx="2460515" cy="707886"/>
+          </a:xfrm>
+          <a:prstGeom prst="rect">
+            <a:avLst/>
+          </a:prstGeom>
+          <a:noFill/>
+        </p:spPr>
+        <p:txBody>
+          <a:bodyPr wrap="square" lIns="91440" tIns="45720" rIns="91440" bIns="45720">
+            <a:spAutoFit/>
+          </a:bodyPr>
+          <a:lstStyle/>
+          <a:p>
+            <a:pPr algn="ctr"/>
+            <a:r>
+              <a:rPr lang="pl-PL" sz="4000" b="1" dirty="0" err="1">
+                <a:ln w="10160">
+                  <a:solidFill>
+                    <a:schemeClr val="accent5"/>
+                  </a:solidFill>
+                  <a:prstDash val="solid"/>
+                </a:ln>
+                <a:solidFill>
+                  <a:srgbClr val="FFFFFF"/>
+                </a:solidFill>
+                <a:effectLst>
+                  <a:outerShdw blurRad="38100" dist="22860" dir="5400000" algn="tl" rotWithShape="0">
+                    <a:srgbClr val="000000">
+                      <a:alpha val="30000"/>
+                    </a:srgbClr>
+                  </a:outerShdw>
+                </a:effectLst>
+              </a:rPr>
+              <a:t>Backlog</a:t>
+            </a:r>
+            <a:endParaRPr lang="pl-PL" sz="4000" b="1" cap="none" spc="0" dirty="0">
+              <a:ln w="10160">
+                <a:solidFill>
+                  <a:schemeClr val="accent5"/>
+                </a:solidFill>
+                <a:prstDash val="solid"/>
+              </a:ln>
+              <a:solidFill>
+                <a:srgbClr val="FFFFFF"/>
+              </a:solidFill>
+              <a:effectLst>
+                <a:outerShdw blurRad="38100" dist="22860" dir="5400000" algn="tl" rotWithShape="0">
+                  <a:srgbClr val="000000">
+                    <a:alpha val="30000"/>
+                  </a:srgbClr>
+                </a:outerShdw>
+              </a:effectLst>
+            </a:endParaRPr>
+          </a:p>
+        </p:txBody>
+      </p:sp>
+      <p:grpSp>
+        <p:nvGrpSpPr>
+          <p:cNvPr id="52" name="Grupa 51">
+            <a:extLst>
+              <a:ext uri="{FF2B5EF4-FFF2-40B4-BE49-F238E27FC236}">
+                <a16:creationId xmlns:a16="http://schemas.microsoft.com/office/drawing/2014/main" id="{15CE7E15-488C-42DD-B721-0B1FDB0D21A0}"/>
+              </a:ext>
+            </a:extLst>
+          </p:cNvPr>
+          <p:cNvGrpSpPr/>
+          <p:nvPr/>
+        </p:nvGrpSpPr>
+        <p:grpSpPr>
+          <a:xfrm>
+            <a:off x="2576183" y="1565329"/>
+            <a:ext cx="170068" cy="4573148"/>
+            <a:chOff x="3015326" y="583457"/>
+            <a:chExt cx="480862" cy="1971789"/>
+          </a:xfrm>
+        </p:grpSpPr>
+        <p:sp>
+          <p:nvSpPr>
+            <p:cNvPr id="50" name="Prostokąt: zaokrąglone rogi 49">
+              <a:extLst>
+                <a:ext uri="{FF2B5EF4-FFF2-40B4-BE49-F238E27FC236}">
+                  <a16:creationId xmlns:a16="http://schemas.microsoft.com/office/drawing/2014/main" id="{4DE2BBEE-9C5C-4C64-8633-8DB8233B0437}"/>
+                </a:ext>
+              </a:extLst>
+            </p:cNvPr>
+            <p:cNvSpPr/>
+            <p:nvPr/>
+          </p:nvSpPr>
+          <p:spPr>
+            <a:xfrm rot="5400000">
+              <a:off x="2315229" y="1374287"/>
+              <a:ext cx="1930895" cy="431023"/>
+            </a:xfrm>
+            <a:prstGeom prst="roundRect">
+              <a:avLst/>
+            </a:prstGeom>
+            <a:ln/>
+          </p:spPr>
+          <p:style>
+            <a:lnRef idx="2">
+              <a:schemeClr val="dk1">
+                <a:shade val="50000"/>
+              </a:schemeClr>
+            </a:lnRef>
+            <a:fillRef idx="1">
+              <a:schemeClr val="dk1"/>
+            </a:fillRef>
+            <a:effectRef idx="0">
+              <a:schemeClr val="dk1"/>
+            </a:effectRef>
+            <a:fontRef idx="minor">
+              <a:schemeClr val="lt1"/>
+            </a:fontRef>
+          </p:style>
+          <p:txBody>
+            <a:bodyPr rtlCol="0" anchor="ctr"/>
+            <a:lstStyle/>
+            <a:p>
+              <a:pPr algn="ctr"/>
+              <a:endParaRPr lang="pl-PL"/>
+            </a:p>
+          </p:txBody>
+        </p:sp>
+        <p:sp>
+          <p:nvSpPr>
+            <p:cNvPr id="51" name="Prostokąt: zaokrąglone rogi 50">
+              <a:extLst>
+                <a:ext uri="{FF2B5EF4-FFF2-40B4-BE49-F238E27FC236}">
+                  <a16:creationId xmlns:a16="http://schemas.microsoft.com/office/drawing/2014/main" id="{1A83F949-267B-4450-ACC5-B122B596FA93}"/>
+                </a:ext>
+              </a:extLst>
+            </p:cNvPr>
+            <p:cNvSpPr/>
+            <p:nvPr/>
+          </p:nvSpPr>
+          <p:spPr>
+            <a:xfrm rot="5400000">
+              <a:off x="2265390" y="1333393"/>
+              <a:ext cx="1930895" cy="431023"/>
+            </a:xfrm>
+            <a:prstGeom prst="roundRect">
+              <a:avLst/>
+            </a:prstGeom>
+            <a:ln>
+              <a:noFill/>
+            </a:ln>
+          </p:spPr>
+          <p:style>
+            <a:lnRef idx="2">
+              <a:schemeClr val="accent6"/>
+            </a:lnRef>
+            <a:fillRef idx="1">
+              <a:schemeClr val="lt1"/>
+            </a:fillRef>
+            <a:effectRef idx="0">
+              <a:schemeClr val="accent6"/>
+            </a:effectRef>
+            <a:fontRef idx="minor">
+              <a:schemeClr val="dk1"/>
+            </a:fontRef>
+          </p:style>
+          <p:txBody>
+            <a:bodyPr rtlCol="0" anchor="ctr"/>
+            <a:lstStyle/>
+            <a:p>
+              <a:pPr algn="ctr"/>
+              <a:endParaRPr lang="pl-PL"/>
+            </a:p>
+          </p:txBody>
+        </p:sp>
+      </p:grpSp>
+      <p:sp>
+        <p:nvSpPr>
+          <p:cNvPr id="54" name="Prostokąt 53">
+            <a:extLst>
+              <a:ext uri="{FF2B5EF4-FFF2-40B4-BE49-F238E27FC236}">
+                <a16:creationId xmlns:a16="http://schemas.microsoft.com/office/drawing/2014/main" id="{02FA3D69-5CEA-448B-9C87-B1D6A23C1915}"/>
+              </a:ext>
+            </a:extLst>
+          </p:cNvPr>
+          <p:cNvSpPr/>
+          <p:nvPr/>
+        </p:nvSpPr>
+        <p:spPr>
+          <a:xfrm>
+            <a:off x="5135923" y="5638389"/>
+            <a:ext cx="2460515" cy="707886"/>
+          </a:xfrm>
+          <a:prstGeom prst="rect">
+            <a:avLst/>
+          </a:prstGeom>
+          <a:noFill/>
+        </p:spPr>
+        <p:txBody>
+          <a:bodyPr wrap="square" lIns="91440" tIns="45720" rIns="91440" bIns="45720">
+            <a:spAutoFit/>
+          </a:bodyPr>
+          <a:lstStyle/>
+          <a:p>
+            <a:pPr algn="ctr"/>
+            <a:r>
+              <a:rPr lang="pl-PL" sz="4000" b="1" dirty="0">
+                <a:ln w="10160">
+                  <a:solidFill>
+                    <a:schemeClr val="accent5"/>
+                  </a:solidFill>
+                  <a:prstDash val="solid"/>
+                </a:ln>
+                <a:solidFill>
+                  <a:srgbClr val="FFFFFF"/>
+                </a:solidFill>
+                <a:effectLst>
+                  <a:outerShdw blurRad="38100" dist="22860" dir="5400000" algn="tl" rotWithShape="0">
+                    <a:srgbClr val="000000">
+                      <a:alpha val="30000"/>
+                    </a:srgbClr>
+                  </a:outerShdw>
+                </a:effectLst>
+              </a:rPr>
+              <a:t>Sprint</a:t>
+            </a:r>
+            <a:endParaRPr lang="pl-PL" sz="4000" b="1" cap="none" spc="0" dirty="0">
+              <a:ln w="10160">
+                <a:solidFill>
+                  <a:schemeClr val="accent5"/>
+                </a:solidFill>
+                <a:prstDash val="solid"/>
+              </a:ln>
+              <a:solidFill>
+                <a:srgbClr val="FFFFFF"/>
+              </a:solidFill>
+              <a:effectLst>
+                <a:outerShdw blurRad="38100" dist="22860" dir="5400000" algn="tl" rotWithShape="0">
+                  <a:srgbClr val="000000">
+                    <a:alpha val="30000"/>
+                  </a:srgbClr>
+                </a:outerShdw>
+              </a:effectLst>
+            </a:endParaRPr>
+          </a:p>
+        </p:txBody>
+      </p:sp>
+      <p:sp>
+        <p:nvSpPr>
+          <p:cNvPr id="55" name="Prostokąt 54">
+            <a:extLst>
+              <a:ext uri="{FF2B5EF4-FFF2-40B4-BE49-F238E27FC236}">
+                <a16:creationId xmlns:a16="http://schemas.microsoft.com/office/drawing/2014/main" id="{A415DDD9-E35E-4133-AF5C-DB5A9E8193E8}"/>
+              </a:ext>
+            </a:extLst>
+          </p:cNvPr>
+          <p:cNvSpPr/>
+          <p:nvPr/>
+        </p:nvSpPr>
+        <p:spPr>
+          <a:xfrm>
+            <a:off x="9477845" y="5638389"/>
+            <a:ext cx="2460515" cy="707886"/>
+          </a:xfrm>
+          <a:prstGeom prst="rect">
+            <a:avLst/>
+          </a:prstGeom>
+          <a:noFill/>
+        </p:spPr>
+        <p:txBody>
+          <a:bodyPr wrap="square" lIns="91440" tIns="45720" rIns="91440" bIns="45720">
+            <a:spAutoFit/>
+          </a:bodyPr>
+          <a:lstStyle/>
+          <a:p>
+            <a:pPr algn="ctr"/>
+            <a:r>
+              <a:rPr lang="pl-PL" sz="4000" b="1" cap="none" spc="0" dirty="0" err="1">
+                <a:ln w="10160">
+                  <a:solidFill>
+                    <a:schemeClr val="accent5"/>
+                  </a:solidFill>
+                  <a:prstDash val="solid"/>
+                </a:ln>
+                <a:solidFill>
+                  <a:srgbClr val="FFFFFF"/>
+                </a:solidFill>
+                <a:effectLst>
+                  <a:outerShdw blurRad="38100" dist="22860" dir="5400000" algn="tl" rotWithShape="0">
+                    <a:srgbClr val="000000">
+                      <a:alpha val="30000"/>
+                    </a:srgbClr>
+                  </a:outerShdw>
+                </a:effectLst>
+              </a:rPr>
+              <a:t>Release</a:t>
+            </a:r>
+            <a:endParaRPr lang="pl-PL" sz="4000" b="1" cap="none" spc="0" dirty="0">
+              <a:ln w="10160">
+                <a:solidFill>
+                  <a:schemeClr val="accent5"/>
+                </a:solidFill>
+                <a:prstDash val="solid"/>
+              </a:ln>
+              <a:solidFill>
+                <a:srgbClr val="FFFFFF"/>
+              </a:solidFill>
+              <a:effectLst>
+                <a:outerShdw blurRad="38100" dist="22860" dir="5400000" algn="tl" rotWithShape="0">
+                  <a:srgbClr val="000000">
+                    <a:alpha val="30000"/>
+                  </a:srgbClr>
+                </a:outerShdw>
+              </a:effectLst>
+            </a:endParaRPr>
+          </a:p>
+        </p:txBody>
+      </p:sp>
+    </p:spTree>
+    <p:extLst>
+      <p:ext uri="{BB962C8B-B14F-4D97-AF65-F5344CB8AC3E}">
+        <p14:creationId xmlns:p14="http://schemas.microsoft.com/office/powerpoint/2010/main" val="601130617"/>
+      </p:ext>
+    </p:extLst>
+  </p:cSld>
+  <p:clrMapOvr>
+    <a:masterClrMapping/>
+  </p:clrMapOvr>
+</p:sld>
+</file>
+
+<file path=ppt/slides/slide3.xml><?xml version="1.0" encoding="utf-8"?>
+<p:sld xmlns:a="http://schemas.openxmlformats.org/drawingml/2006/main" xmlns:r="http://schemas.openxmlformats.org/officeDocument/2006/relationships" xmlns:p="http://schemas.openxmlformats.org/presentationml/2006/main">
+  <p:cSld>
+    <p:bg>
+      <p:bgPr>
+        <a:gradFill>
+          <a:gsLst>
+            <a:gs pos="54000">
+              <a:srgbClr val="07A1D7"/>
+            </a:gs>
+            <a:gs pos="100000">
+              <a:srgbClr val="11CFD9"/>
+            </a:gs>
+          </a:gsLst>
+          <a:lin ang="5400000" scaled="1"/>
+        </a:gradFill>
+        <a:effectLst/>
+      </p:bgPr>
+    </p:bg>
+    <p:spTree>
+      <p:nvGrpSpPr>
+        <p:cNvPr id="1" name=""/>
+        <p:cNvGrpSpPr/>
+        <p:nvPr/>
+      </p:nvGrpSpPr>
+      <p:grpSpPr>
+        <a:xfrm>
+          <a:off x="0" y="0"/>
+          <a:ext cx="0" cy="0"/>
+          <a:chOff x="0" y="0"/>
+          <a:chExt cx="0" cy="0"/>
+        </a:xfrm>
+      </p:grpSpPr>
+      <p:pic>
+        <p:nvPicPr>
+          <p:cNvPr id="5" name="Obraz 4">
+            <a:extLst>
+              <a:ext uri="{FF2B5EF4-FFF2-40B4-BE49-F238E27FC236}">
+                <a16:creationId xmlns:a16="http://schemas.microsoft.com/office/drawing/2014/main" id="{FA2B5562-A690-428E-8278-450D1EECD2E4}"/>
+              </a:ext>
+            </a:extLst>
+          </p:cNvPr>
+          <p:cNvPicPr>
+            <a:picLocks noChangeAspect="1"/>
+          </p:cNvPicPr>
+          <p:nvPr/>
+        </p:nvPicPr>
+        <p:blipFill>
+          <a:blip r:embed="rId2">
+            <a:extLst>
+              <a:ext uri="{28A0092B-C50C-407E-A947-70E740481C1C}">
+                <a14:useLocalDpi xmlns:a14="http://schemas.microsoft.com/office/drawing/2010/main" val="0"/>
+              </a:ext>
+            </a:extLst>
+          </a:blip>
+          <a:stretch>
+            <a:fillRect/>
+          </a:stretch>
+        </p:blipFill>
+        <p:spPr>
+          <a:xfrm>
+            <a:off x="153944" y="139485"/>
+            <a:ext cx="2471463" cy="1425844"/>
+          </a:xfrm>
+          <a:prstGeom prst="rect">
+            <a:avLst/>
+          </a:prstGeom>
+        </p:spPr>
+      </p:pic>
+      <p:pic>
+        <p:nvPicPr>
+          <p:cNvPr id="10" name="Grafika 9" descr="Uścisk dłoni">
+            <a:extLst>
+              <a:ext uri="{FF2B5EF4-FFF2-40B4-BE49-F238E27FC236}">
+                <a16:creationId xmlns:a16="http://schemas.microsoft.com/office/drawing/2014/main" id="{43E8A39C-E342-4A1A-895D-358E46B367B1}"/>
+              </a:ext>
+            </a:extLst>
+          </p:cNvPr>
+          <p:cNvPicPr>
+            <a:picLocks noChangeAspect="1"/>
+          </p:cNvPicPr>
+          <p:nvPr/>
+        </p:nvPicPr>
+        <p:blipFill>
+          <a:blip r:embed="rId3">
+            <a:extLst>
+              <a:ext uri="{28A0092B-C50C-407E-A947-70E740481C1C}">
+                <a14:useLocalDpi xmlns:a14="http://schemas.microsoft.com/office/drawing/2010/main" val="0"/>
+              </a:ext>
+              <a:ext uri="{96DAC541-7B7A-43D3-8B79-37D633B846F1}">
+                <asvg:svgBlip xmlns:asvg="http://schemas.microsoft.com/office/drawing/2016/SVG/main" r:embed="rId4"/>
+              </a:ext>
+            </a:extLst>
+          </a:blip>
+          <a:stretch>
+            <a:fillRect/>
+          </a:stretch>
+        </p:blipFill>
+        <p:spPr>
+          <a:xfrm>
+            <a:off x="3805085" y="700299"/>
+            <a:ext cx="5134070" cy="5134070"/>
+          </a:xfrm>
+          <a:prstGeom prst="rect">
+            <a:avLst/>
+          </a:prstGeom>
+        </p:spPr>
+      </p:pic>
+      <p:grpSp>
+        <p:nvGrpSpPr>
+          <p:cNvPr id="16" name="Grupa 15">
+            <a:extLst>
+              <a:ext uri="{FF2B5EF4-FFF2-40B4-BE49-F238E27FC236}">
+                <a16:creationId xmlns:a16="http://schemas.microsoft.com/office/drawing/2014/main" id="{B79AE4CA-E867-44F2-9070-7D48A6C6EBD5}"/>
+              </a:ext>
+            </a:extLst>
+          </p:cNvPr>
+          <p:cNvGrpSpPr/>
+          <p:nvPr/>
+        </p:nvGrpSpPr>
+        <p:grpSpPr>
+          <a:xfrm>
+            <a:off x="8959242" y="3070653"/>
+            <a:ext cx="2941986" cy="2240648"/>
+            <a:chOff x="9315357" y="2584728"/>
+            <a:chExt cx="2941986" cy="2240648"/>
+          </a:xfrm>
+        </p:grpSpPr>
+        <p:pic>
+          <p:nvPicPr>
+            <p:cNvPr id="12" name="Grafika 11" descr="Pracownik biurowy">
+              <a:extLst>
+                <a:ext uri="{FF2B5EF4-FFF2-40B4-BE49-F238E27FC236}">
+                  <a16:creationId xmlns:a16="http://schemas.microsoft.com/office/drawing/2014/main" id="{7FF245DF-6704-4B7A-A1D6-62E8C4A789AF}"/>
+                </a:ext>
+              </a:extLst>
+            </p:cNvPr>
+            <p:cNvPicPr>
+              <a:picLocks noChangeAspect="1"/>
+            </p:cNvPicPr>
+            <p:nvPr/>
+          </p:nvPicPr>
+          <p:blipFill>
+            <a:blip r:embed="rId5">
+              <a:extLst>
+                <a:ext uri="{28A0092B-C50C-407E-A947-70E740481C1C}">
+                  <a14:useLocalDpi xmlns:a14="http://schemas.microsoft.com/office/drawing/2010/main" val="0"/>
+                </a:ext>
+                <a:ext uri="{96DAC541-7B7A-43D3-8B79-37D633B846F1}">
+                  <asvg:svgBlip xmlns:asvg="http://schemas.microsoft.com/office/drawing/2016/SVG/main" r:embed="rId6"/>
+                </a:ext>
+              </a:extLst>
+            </a:blip>
+            <a:stretch>
+              <a:fillRect/>
+            </a:stretch>
+          </p:blipFill>
+          <p:spPr>
+            <a:xfrm>
+              <a:off x="9315357" y="2584728"/>
+              <a:ext cx="1365212" cy="1365212"/>
+            </a:xfrm>
+            <a:prstGeom prst="rect">
+              <a:avLst/>
+            </a:prstGeom>
+          </p:spPr>
+        </p:pic>
+        <p:pic>
+          <p:nvPicPr>
+            <p:cNvPr id="13" name="Grafika 12" descr="Pracownik biurowy">
+              <a:extLst>
+                <a:ext uri="{FF2B5EF4-FFF2-40B4-BE49-F238E27FC236}">
+                  <a16:creationId xmlns:a16="http://schemas.microsoft.com/office/drawing/2014/main" id="{71A47239-6F38-4D6B-A727-D45C3DEB557E}"/>
+                </a:ext>
+              </a:extLst>
+            </p:cNvPr>
+            <p:cNvPicPr>
+              <a:picLocks noChangeAspect="1"/>
+            </p:cNvPicPr>
+            <p:nvPr/>
+          </p:nvPicPr>
+          <p:blipFill>
+            <a:blip r:embed="rId5">
+              <a:extLst>
+                <a:ext uri="{28A0092B-C50C-407E-A947-70E740481C1C}">
+                  <a14:useLocalDpi xmlns:a14="http://schemas.microsoft.com/office/drawing/2010/main" val="0"/>
+                </a:ext>
+                <a:ext uri="{96DAC541-7B7A-43D3-8B79-37D633B846F1}">
+                  <asvg:svgBlip xmlns:asvg="http://schemas.microsoft.com/office/drawing/2016/SVG/main" r:embed="rId6"/>
+                </a:ext>
+              </a:extLst>
+            </a:blip>
+            <a:stretch>
+              <a:fillRect/>
+            </a:stretch>
+          </p:blipFill>
+          <p:spPr>
+            <a:xfrm>
+              <a:off x="10103744" y="3460164"/>
+              <a:ext cx="1365212" cy="1365212"/>
+            </a:xfrm>
+            <a:prstGeom prst="rect">
+              <a:avLst/>
+            </a:prstGeom>
+          </p:spPr>
+        </p:pic>
+        <p:pic>
+          <p:nvPicPr>
+            <p:cNvPr id="14" name="Grafika 13" descr="Pracownik biurowy">
+              <a:extLst>
+                <a:ext uri="{FF2B5EF4-FFF2-40B4-BE49-F238E27FC236}">
+                  <a16:creationId xmlns:a16="http://schemas.microsoft.com/office/drawing/2014/main" id="{803158BE-5E55-4CE5-996A-DE4F5A66B730}"/>
+                </a:ext>
+              </a:extLst>
+            </p:cNvPr>
+            <p:cNvPicPr>
+              <a:picLocks noChangeAspect="1"/>
+            </p:cNvPicPr>
+            <p:nvPr/>
+          </p:nvPicPr>
+          <p:blipFill>
+            <a:blip r:embed="rId5">
+              <a:extLst>
+                <a:ext uri="{28A0092B-C50C-407E-A947-70E740481C1C}">
+                  <a14:useLocalDpi xmlns:a14="http://schemas.microsoft.com/office/drawing/2010/main" val="0"/>
+                </a:ext>
+                <a:ext uri="{96DAC541-7B7A-43D3-8B79-37D633B846F1}">
+                  <asvg:svgBlip xmlns:asvg="http://schemas.microsoft.com/office/drawing/2016/SVG/main" r:embed="rId6"/>
+                </a:ext>
+              </a:extLst>
+            </a:blip>
+            <a:stretch>
+              <a:fillRect/>
+            </a:stretch>
+          </p:blipFill>
+          <p:spPr>
+            <a:xfrm>
+              <a:off x="10892131" y="2900955"/>
+              <a:ext cx="1365212" cy="1365212"/>
+            </a:xfrm>
+            <a:prstGeom prst="rect">
+              <a:avLst/>
+            </a:prstGeom>
+          </p:spPr>
+        </p:pic>
+      </p:grpSp>
+      <p:grpSp>
+        <p:nvGrpSpPr>
+          <p:cNvPr id="17" name="Grupa 16">
+            <a:extLst>
+              <a:ext uri="{FF2B5EF4-FFF2-40B4-BE49-F238E27FC236}">
+                <a16:creationId xmlns:a16="http://schemas.microsoft.com/office/drawing/2014/main" id="{5375CA3A-B624-48D7-A463-FCC3F236962B}"/>
+              </a:ext>
+            </a:extLst>
+          </p:cNvPr>
+          <p:cNvGrpSpPr/>
+          <p:nvPr/>
+        </p:nvGrpSpPr>
+        <p:grpSpPr>
+          <a:xfrm>
+            <a:off x="8853461" y="3027838"/>
+            <a:ext cx="2941986" cy="2240648"/>
+            <a:chOff x="9315357" y="2584728"/>
+            <a:chExt cx="2941986" cy="2240648"/>
+          </a:xfrm>
+          <a:solidFill>
+            <a:schemeClr val="bg1"/>
+          </a:solidFill>
+        </p:grpSpPr>
+        <p:pic>
+          <p:nvPicPr>
+            <p:cNvPr id="18" name="Grafika 17" descr="Pracownik biurowy">
+              <a:extLst>
+                <a:ext uri="{FF2B5EF4-FFF2-40B4-BE49-F238E27FC236}">
+                  <a16:creationId xmlns:a16="http://schemas.microsoft.com/office/drawing/2014/main" id="{62D6BFC0-61ED-460A-952A-5366CA02274B}"/>
+                </a:ext>
+              </a:extLst>
+            </p:cNvPr>
+            <p:cNvPicPr>
+              <a:picLocks noChangeAspect="1"/>
+            </p:cNvPicPr>
+            <p:nvPr/>
+          </p:nvPicPr>
+          <p:blipFill>
+            <a:blip r:embed="rId7">
+              <a:extLst>
+                <a:ext uri="{28A0092B-C50C-407E-A947-70E740481C1C}">
+                  <a14:useLocalDpi xmlns:a14="http://schemas.microsoft.com/office/drawing/2010/main" val="0"/>
+                </a:ext>
+                <a:ext uri="{96DAC541-7B7A-43D3-8B79-37D633B846F1}">
+                  <asvg:svgBlip xmlns:asvg="http://schemas.microsoft.com/office/drawing/2016/SVG/main" r:embed="rId8"/>
+                </a:ext>
+              </a:extLst>
+            </a:blip>
+            <a:stretch>
+              <a:fillRect/>
+            </a:stretch>
+          </p:blipFill>
+          <p:spPr>
+            <a:xfrm>
+              <a:off x="9315357" y="2584728"/>
+              <a:ext cx="1365212" cy="1365212"/>
+            </a:xfrm>
+            <a:prstGeom prst="rect">
+              <a:avLst/>
+            </a:prstGeom>
+          </p:spPr>
+        </p:pic>
+        <p:pic>
+          <p:nvPicPr>
+            <p:cNvPr id="19" name="Grafika 18" descr="Pracownik biurowy">
+              <a:extLst>
+                <a:ext uri="{FF2B5EF4-FFF2-40B4-BE49-F238E27FC236}">
+                  <a16:creationId xmlns:a16="http://schemas.microsoft.com/office/drawing/2014/main" id="{F319ECBD-05AD-4FF7-AAF2-00C5983D90FE}"/>
+                </a:ext>
+              </a:extLst>
+            </p:cNvPr>
+            <p:cNvPicPr>
+              <a:picLocks noChangeAspect="1"/>
+            </p:cNvPicPr>
+            <p:nvPr/>
+          </p:nvPicPr>
+          <p:blipFill>
+            <a:blip r:embed="rId7">
+              <a:extLst>
+                <a:ext uri="{28A0092B-C50C-407E-A947-70E740481C1C}">
+                  <a14:useLocalDpi xmlns:a14="http://schemas.microsoft.com/office/drawing/2010/main" val="0"/>
+                </a:ext>
+                <a:ext uri="{96DAC541-7B7A-43D3-8B79-37D633B846F1}">
+                  <asvg:svgBlip xmlns:asvg="http://schemas.microsoft.com/office/drawing/2016/SVG/main" r:embed="rId8"/>
+                </a:ext>
+              </a:extLst>
+            </a:blip>
+            <a:stretch>
+              <a:fillRect/>
+            </a:stretch>
+          </p:blipFill>
+          <p:spPr>
+            <a:xfrm>
+              <a:off x="10103744" y="3460164"/>
+              <a:ext cx="1365212" cy="1365212"/>
+            </a:xfrm>
+            <a:prstGeom prst="rect">
+              <a:avLst/>
+            </a:prstGeom>
+          </p:spPr>
+        </p:pic>
+        <p:pic>
+          <p:nvPicPr>
+            <p:cNvPr id="20" name="Grafika 19" descr="Pracownik biurowy">
+              <a:extLst>
+                <a:ext uri="{FF2B5EF4-FFF2-40B4-BE49-F238E27FC236}">
+                  <a16:creationId xmlns:a16="http://schemas.microsoft.com/office/drawing/2014/main" id="{07285869-8BDD-4DD3-9A06-21DE9ACE8EBF}"/>
+                </a:ext>
+              </a:extLst>
+            </p:cNvPr>
+            <p:cNvPicPr>
+              <a:picLocks noChangeAspect="1"/>
+            </p:cNvPicPr>
+            <p:nvPr/>
+          </p:nvPicPr>
+          <p:blipFill>
+            <a:blip r:embed="rId7">
+              <a:extLst>
+                <a:ext uri="{28A0092B-C50C-407E-A947-70E740481C1C}">
+                  <a14:useLocalDpi xmlns:a14="http://schemas.microsoft.com/office/drawing/2010/main" val="0"/>
+                </a:ext>
+                <a:ext uri="{96DAC541-7B7A-43D3-8B79-37D633B846F1}">
+                  <asvg:svgBlip xmlns:asvg="http://schemas.microsoft.com/office/drawing/2016/SVG/main" r:embed="rId8"/>
+                </a:ext>
+              </a:extLst>
+            </a:blip>
+            <a:stretch>
+              <a:fillRect/>
+            </a:stretch>
+          </p:blipFill>
+          <p:spPr>
+            <a:xfrm>
+              <a:off x="10892131" y="2900955"/>
+              <a:ext cx="1365212" cy="1365212"/>
+            </a:xfrm>
+            <a:prstGeom prst="rect">
+              <a:avLst/>
+            </a:prstGeom>
+          </p:spPr>
+        </p:pic>
+      </p:grpSp>
+      <p:pic>
+        <p:nvPicPr>
+          <p:cNvPr id="21" name="Grafika 20" descr="Uścisk dłoni">
+            <a:extLst>
+              <a:ext uri="{FF2B5EF4-FFF2-40B4-BE49-F238E27FC236}">
+                <a16:creationId xmlns:a16="http://schemas.microsoft.com/office/drawing/2014/main" id="{8F69160B-4308-4826-94D4-890480B82D1B}"/>
+              </a:ext>
+            </a:extLst>
+          </p:cNvPr>
+          <p:cNvPicPr>
+            <a:picLocks noChangeAspect="1"/>
+          </p:cNvPicPr>
+          <p:nvPr/>
+        </p:nvPicPr>
+        <p:blipFill>
+          <a:blip r:embed="rId9">
+            <a:extLst>
+              <a:ext uri="{28A0092B-C50C-407E-A947-70E740481C1C}">
+                <a14:useLocalDpi xmlns:a14="http://schemas.microsoft.com/office/drawing/2010/main" val="0"/>
+              </a:ext>
+              <a:ext uri="{96DAC541-7B7A-43D3-8B79-37D633B846F1}">
+                <asvg:svgBlip xmlns:asvg="http://schemas.microsoft.com/office/drawing/2016/SVG/main" r:embed="rId10"/>
+              </a:ext>
+            </a:extLst>
+          </a:blip>
+          <a:stretch>
+            <a:fillRect/>
+          </a:stretch>
+        </p:blipFill>
+        <p:spPr>
+          <a:xfrm>
+            <a:off x="3784998" y="600908"/>
+            <a:ext cx="5134070" cy="5134070"/>
+          </a:xfrm>
+          <a:prstGeom prst="rect">
+            <a:avLst/>
+          </a:prstGeom>
+        </p:spPr>
+      </p:pic>
+      <p:grpSp>
+        <p:nvGrpSpPr>
+          <p:cNvPr id="2" name="Grupa 1">
+            <a:extLst>
+              <a:ext uri="{FF2B5EF4-FFF2-40B4-BE49-F238E27FC236}">
+                <a16:creationId xmlns:a16="http://schemas.microsoft.com/office/drawing/2014/main" id="{5A81BD43-8992-411B-B989-8BEA45E77262}"/>
+              </a:ext>
+            </a:extLst>
+          </p:cNvPr>
+          <p:cNvGrpSpPr/>
+          <p:nvPr/>
+        </p:nvGrpSpPr>
+        <p:grpSpPr>
+          <a:xfrm>
+            <a:off x="861707" y="2858139"/>
+            <a:ext cx="2523997" cy="2453162"/>
+            <a:chOff x="861707" y="2858139"/>
+            <a:chExt cx="2523997" cy="2453162"/>
+          </a:xfrm>
+        </p:grpSpPr>
+        <p:grpSp>
+          <p:nvGrpSpPr>
+            <p:cNvPr id="15" name="Grupa 14">
+              <a:extLst>
+                <a:ext uri="{FF2B5EF4-FFF2-40B4-BE49-F238E27FC236}">
+                  <a16:creationId xmlns:a16="http://schemas.microsoft.com/office/drawing/2014/main" id="{E6368EE1-4515-432C-8043-AAA31E47CD19}"/>
+                </a:ext>
+              </a:extLst>
+            </p:cNvPr>
+            <p:cNvGrpSpPr/>
+            <p:nvPr/>
+          </p:nvGrpSpPr>
+          <p:grpSpPr>
+            <a:xfrm>
+              <a:off x="882424" y="2974238"/>
+              <a:ext cx="2503280" cy="2337063"/>
+              <a:chOff x="901148" y="2166492"/>
+              <a:chExt cx="2503280" cy="2337063"/>
+            </a:xfrm>
+          </p:grpSpPr>
+          <p:pic>
+            <p:nvPicPr>
+              <p:cNvPr id="3" name="Grafika 2" descr="Koła zębate">
+                <a:extLst>
+                  <a:ext uri="{FF2B5EF4-FFF2-40B4-BE49-F238E27FC236}">
+                    <a16:creationId xmlns:a16="http://schemas.microsoft.com/office/drawing/2014/main" id="{94B09A1F-458C-46E9-B416-502D546E35C4}"/>
+                  </a:ext>
+                </a:extLst>
+              </p:cNvPr>
+              <p:cNvPicPr>
+                <a:picLocks noChangeAspect="1"/>
+              </p:cNvPicPr>
+              <p:nvPr/>
+            </p:nvPicPr>
+            <p:blipFill>
+              <a:blip r:embed="rId11">
+                <a:extLst>
+                  <a:ext uri="{28A0092B-C50C-407E-A947-70E740481C1C}">
+                    <a14:useLocalDpi xmlns:a14="http://schemas.microsoft.com/office/drawing/2010/main" val="0"/>
+                  </a:ext>
+                  <a:ext uri="{96DAC541-7B7A-43D3-8B79-37D633B846F1}">
+                    <asvg:svgBlip xmlns:asvg="http://schemas.microsoft.com/office/drawing/2016/SVG/main" r:embed="rId12"/>
+                  </a:ext>
+                </a:extLst>
+              </a:blip>
+              <a:stretch>
+                <a:fillRect/>
+              </a:stretch>
+            </p:blipFill>
+            <p:spPr>
+              <a:xfrm>
+                <a:off x="1846386" y="2945513"/>
+                <a:ext cx="1558042" cy="1558042"/>
+              </a:xfrm>
+              <a:prstGeom prst="rect">
+                <a:avLst/>
+              </a:prstGeom>
+            </p:spPr>
+          </p:pic>
+          <p:pic>
+            <p:nvPicPr>
+              <p:cNvPr id="6" name="Grafika 5" descr="Pojedyncze koło zębate">
+                <a:extLst>
+                  <a:ext uri="{FF2B5EF4-FFF2-40B4-BE49-F238E27FC236}">
+                    <a16:creationId xmlns:a16="http://schemas.microsoft.com/office/drawing/2014/main" id="{C5809225-676D-43FD-ACA7-F35351E42C82}"/>
+                  </a:ext>
+                </a:extLst>
+              </p:cNvPr>
+              <p:cNvPicPr>
+                <a:picLocks noChangeAspect="1"/>
+              </p:cNvPicPr>
+              <p:nvPr/>
+            </p:nvPicPr>
+            <p:blipFill>
+              <a:blip r:embed="rId13">
+                <a:extLst>
+                  <a:ext uri="{28A0092B-C50C-407E-A947-70E740481C1C}">
+                    <a14:useLocalDpi xmlns:a14="http://schemas.microsoft.com/office/drawing/2010/main" val="0"/>
+                  </a:ext>
+                  <a:ext uri="{96DAC541-7B7A-43D3-8B79-37D633B846F1}">
+                    <asvg:svgBlip xmlns:asvg="http://schemas.microsoft.com/office/drawing/2016/SVG/main" r:embed="rId14"/>
+                  </a:ext>
+                </a:extLst>
+              </a:blip>
+              <a:stretch>
+                <a:fillRect/>
+              </a:stretch>
+            </p:blipFill>
+            <p:spPr>
+              <a:xfrm>
+                <a:off x="901148" y="2166492"/>
+                <a:ext cx="1558042" cy="1558042"/>
+              </a:xfrm>
+              <a:prstGeom prst="rect">
+                <a:avLst/>
+              </a:prstGeom>
+            </p:spPr>
+          </p:pic>
+        </p:grpSp>
+        <p:grpSp>
+          <p:nvGrpSpPr>
+            <p:cNvPr id="22" name="Grupa 21">
+              <a:extLst>
+                <a:ext uri="{FF2B5EF4-FFF2-40B4-BE49-F238E27FC236}">
+                  <a16:creationId xmlns:a16="http://schemas.microsoft.com/office/drawing/2014/main" id="{1FA60A96-DD3B-4249-A8FD-06889D1000F7}"/>
+                </a:ext>
+              </a:extLst>
+            </p:cNvPr>
+            <p:cNvGrpSpPr/>
+            <p:nvPr/>
+          </p:nvGrpSpPr>
+          <p:grpSpPr>
+            <a:xfrm>
+              <a:off x="861707" y="2858139"/>
+              <a:ext cx="2503280" cy="2337063"/>
+              <a:chOff x="901148" y="2166492"/>
+              <a:chExt cx="2503280" cy="2337063"/>
+            </a:xfrm>
+            <a:solidFill>
+              <a:schemeClr val="bg1"/>
+            </a:solidFill>
+          </p:grpSpPr>
+          <p:pic>
+            <p:nvPicPr>
+              <p:cNvPr id="23" name="Grafika 22" descr="Koła zębate">
+                <a:extLst>
+                  <a:ext uri="{FF2B5EF4-FFF2-40B4-BE49-F238E27FC236}">
+                    <a16:creationId xmlns:a16="http://schemas.microsoft.com/office/drawing/2014/main" id="{F7D551CB-0B57-4934-9549-B11C5DFA865F}"/>
+                  </a:ext>
+                </a:extLst>
+              </p:cNvPr>
+              <p:cNvPicPr>
+                <a:picLocks noChangeAspect="1"/>
+              </p:cNvPicPr>
+              <p:nvPr/>
+            </p:nvPicPr>
+            <p:blipFill>
+              <a:blip r:embed="rId15">
+                <a:extLst>
+                  <a:ext uri="{28A0092B-C50C-407E-A947-70E740481C1C}">
+                    <a14:useLocalDpi xmlns:a14="http://schemas.microsoft.com/office/drawing/2010/main" val="0"/>
+                  </a:ext>
+                  <a:ext uri="{96DAC541-7B7A-43D3-8B79-37D633B846F1}">
+                    <asvg:svgBlip xmlns:asvg="http://schemas.microsoft.com/office/drawing/2016/SVG/main" r:embed="rId16"/>
+                  </a:ext>
+                </a:extLst>
+              </a:blip>
+              <a:stretch>
+                <a:fillRect/>
+              </a:stretch>
+            </p:blipFill>
+            <p:spPr>
+              <a:xfrm>
+                <a:off x="1846386" y="2945513"/>
+                <a:ext cx="1558042" cy="1558042"/>
+              </a:xfrm>
+              <a:prstGeom prst="rect">
+                <a:avLst/>
+              </a:prstGeom>
+            </p:spPr>
+          </p:pic>
+          <p:pic>
+            <p:nvPicPr>
+              <p:cNvPr id="24" name="Grafika 23" descr="Pojedyncze koło zębate">
+                <a:extLst>
+                  <a:ext uri="{FF2B5EF4-FFF2-40B4-BE49-F238E27FC236}">
+                    <a16:creationId xmlns:a16="http://schemas.microsoft.com/office/drawing/2014/main" id="{5AB7828F-3C3D-4C2E-9258-4BE0996DA181}"/>
+                  </a:ext>
+                </a:extLst>
+              </p:cNvPr>
+              <p:cNvPicPr>
+                <a:picLocks noChangeAspect="1"/>
+              </p:cNvPicPr>
+              <p:nvPr/>
+            </p:nvPicPr>
+            <p:blipFill>
+              <a:blip r:embed="rId17">
+                <a:extLst>
+                  <a:ext uri="{28A0092B-C50C-407E-A947-70E740481C1C}">
+                    <a14:useLocalDpi xmlns:a14="http://schemas.microsoft.com/office/drawing/2010/main" val="0"/>
+                  </a:ext>
+                  <a:ext uri="{96DAC541-7B7A-43D3-8B79-37D633B846F1}">
+                    <asvg:svgBlip xmlns:asvg="http://schemas.microsoft.com/office/drawing/2016/SVG/main" r:embed="rId18"/>
+                  </a:ext>
+                </a:extLst>
+              </a:blip>
+              <a:stretch>
+                <a:fillRect/>
+              </a:stretch>
+            </p:blipFill>
+            <p:spPr>
+              <a:xfrm>
+                <a:off x="901148" y="2166492"/>
+                <a:ext cx="1558042" cy="1558042"/>
+              </a:xfrm>
+              <a:prstGeom prst="rect">
+                <a:avLst/>
+              </a:prstGeom>
+            </p:spPr>
+          </p:pic>
+        </p:grpSp>
+      </p:grpSp>
+      <p:sp>
+        <p:nvSpPr>
+          <p:cNvPr id="25" name="Prostokąt 24">
+            <a:extLst>
+              <a:ext uri="{FF2B5EF4-FFF2-40B4-BE49-F238E27FC236}">
+                <a16:creationId xmlns:a16="http://schemas.microsoft.com/office/drawing/2014/main" id="{7552D539-ACA4-436B-B2ED-44A4CAA474F2}"/>
+              </a:ext>
+            </a:extLst>
+          </p:cNvPr>
+          <p:cNvSpPr/>
+          <p:nvPr/>
+        </p:nvSpPr>
+        <p:spPr>
+          <a:xfrm>
+            <a:off x="4909620" y="4907511"/>
+            <a:ext cx="2925000" cy="1754326"/>
+          </a:xfrm>
+          <a:prstGeom prst="rect">
+            <a:avLst/>
+          </a:prstGeom>
+          <a:noFill/>
+        </p:spPr>
+        <p:txBody>
+          <a:bodyPr wrap="square" lIns="91440" tIns="45720" rIns="91440" bIns="45720">
+            <a:spAutoFit/>
+          </a:bodyPr>
+          <a:lstStyle/>
+          <a:p>
+            <a:pPr algn="ctr"/>
+            <a:r>
+              <a:rPr lang="pl-PL" sz="5400" b="1" dirty="0">
+                <a:ln w="10160">
+                  <a:solidFill>
+                    <a:schemeClr val="accent5"/>
+                  </a:solidFill>
+                  <a:prstDash val="solid"/>
+                </a:ln>
+                <a:solidFill>
+                  <a:srgbClr val="FFFFFF"/>
+                </a:solidFill>
+                <a:effectLst>
+                  <a:outerShdw blurRad="38100" dist="22860" dir="5400000" algn="tl" rotWithShape="0">
+                    <a:srgbClr val="000000">
+                      <a:alpha val="30000"/>
+                    </a:srgbClr>
+                  </a:outerShdw>
+                </a:effectLst>
+              </a:rPr>
+              <a:t>Business </a:t>
+            </a:r>
+            <a:r>
+              <a:rPr lang="pl-PL" sz="5400" b="1" dirty="0" err="1">
+                <a:ln w="10160">
+                  <a:solidFill>
+                    <a:schemeClr val="accent5"/>
+                  </a:solidFill>
+                  <a:prstDash val="solid"/>
+                </a:ln>
+                <a:solidFill>
+                  <a:srgbClr val="FFFFFF"/>
+                </a:solidFill>
+                <a:effectLst>
+                  <a:outerShdw blurRad="38100" dist="22860" dir="5400000" algn="tl" rotWithShape="0">
+                    <a:srgbClr val="000000">
+                      <a:alpha val="30000"/>
+                    </a:srgbClr>
+                  </a:outerShdw>
+                </a:effectLst>
+              </a:rPr>
+              <a:t>first</a:t>
+            </a:r>
+            <a:endParaRPr lang="pl-PL" sz="5400" b="1" cap="none" spc="0" dirty="0">
+              <a:ln w="10160">
+                <a:solidFill>
+                  <a:schemeClr val="accent5"/>
+                </a:solidFill>
+                <a:prstDash val="solid"/>
+              </a:ln>
+              <a:solidFill>
+                <a:srgbClr val="FFFFFF"/>
+              </a:solidFill>
+              <a:effectLst>
+                <a:outerShdw blurRad="38100" dist="22860" dir="5400000" algn="tl" rotWithShape="0">
+                  <a:srgbClr val="000000">
+                    <a:alpha val="30000"/>
+                  </a:srgbClr>
+                </a:outerShdw>
+              </a:effectLst>
+            </a:endParaRPr>
+          </a:p>
+        </p:txBody>
+      </p:sp>
+    </p:spTree>
+    <p:extLst>
+      <p:ext uri="{BB962C8B-B14F-4D97-AF65-F5344CB8AC3E}">
+        <p14:creationId xmlns:p14="http://schemas.microsoft.com/office/powerpoint/2010/main" val="2630656502"/>
+      </p:ext>
+    </p:extLst>
+  </p:cSld>
+  <p:clrMapOvr>
+    <a:masterClrMapping/>
+  </p:clrMapOvr>
+</p:sld>
+</file>
+
+<file path=ppt/slides/slide4.xml><?xml version="1.0" encoding="utf-8"?>
+<p:sld xmlns:a="http://schemas.openxmlformats.org/drawingml/2006/main" xmlns:r="http://schemas.openxmlformats.org/officeDocument/2006/relationships" xmlns:p="http://schemas.openxmlformats.org/presentationml/2006/main">
+  <p:cSld>
+    <p:bg>
+      <p:bgPr>
+        <a:gradFill>
+          <a:gsLst>
+            <a:gs pos="54000">
+              <a:srgbClr val="07A1D7"/>
+            </a:gs>
+            <a:gs pos="100000">
+              <a:srgbClr val="11CFD9"/>
+            </a:gs>
+          </a:gsLst>
+          <a:lin ang="5400000" scaled="1"/>
+        </a:gradFill>
+        <a:effectLst/>
+      </p:bgPr>
+    </p:bg>
+    <p:spTree>
+      <p:nvGrpSpPr>
+        <p:cNvPr id="1" name=""/>
+        <p:cNvGrpSpPr/>
+        <p:nvPr/>
+      </p:nvGrpSpPr>
+      <p:grpSpPr>
+        <a:xfrm>
+          <a:off x="0" y="0"/>
+          <a:ext cx="0" cy="0"/>
+          <a:chOff x="0" y="0"/>
+          <a:chExt cx="0" cy="0"/>
+        </a:xfrm>
+      </p:grpSpPr>
+      <p:pic>
+        <p:nvPicPr>
+          <p:cNvPr id="5" name="Obraz 4">
+            <a:extLst>
+              <a:ext uri="{FF2B5EF4-FFF2-40B4-BE49-F238E27FC236}">
+                <a16:creationId xmlns:a16="http://schemas.microsoft.com/office/drawing/2014/main" id="{FA2B5562-A690-428E-8278-450D1EECD2E4}"/>
+              </a:ext>
+            </a:extLst>
+          </p:cNvPr>
+          <p:cNvPicPr>
+            <a:picLocks noChangeAspect="1"/>
+          </p:cNvPicPr>
+          <p:nvPr/>
+        </p:nvPicPr>
+        <p:blipFill>
+          <a:blip r:embed="rId2">
+            <a:extLst>
+              <a:ext uri="{28A0092B-C50C-407E-A947-70E740481C1C}">
+                <a14:useLocalDpi xmlns:a14="http://schemas.microsoft.com/office/drawing/2010/main" val="0"/>
+              </a:ext>
+            </a:extLst>
+          </a:blip>
+          <a:stretch>
+            <a:fillRect/>
+          </a:stretch>
+        </p:blipFill>
+        <p:spPr>
+          <a:xfrm>
+            <a:off x="153944" y="139485"/>
+            <a:ext cx="2471463" cy="1425844"/>
+          </a:xfrm>
+          <a:prstGeom prst="rect">
+            <a:avLst/>
+          </a:prstGeom>
+        </p:spPr>
+      </p:pic>
       <p:pic>
         <p:nvPicPr>
           <p:cNvPr id="3" name="Grafika 2" descr="Tabela">
@@ -6510,7 +9234,7 @@
 </p:sld>
 </file>
 
-<file path=ppt/slides/slide3.xml><?xml version="1.0" encoding="utf-8"?>
+<file path=ppt/slides/slide5.xml><?xml version="1.0" encoding="utf-8"?>
 <p:sld xmlns:a="http://schemas.openxmlformats.org/drawingml/2006/main" xmlns:r="http://schemas.openxmlformats.org/officeDocument/2006/relationships" xmlns:p="http://schemas.openxmlformats.org/presentationml/2006/main">
   <p:cSld>
     <p:bg>

</xml_diff>